<commit_message>
update images for exp
</commit_message>
<xml_diff>
--- a/az-amlw-hol-arch.pptx
+++ b/az-amlw-hol-arch.pptx
@@ -14,9 +14,11 @@
     <p:sldId id="265" r:id="rId8"/>
     <p:sldId id="266" r:id="rId9"/>
     <p:sldId id="267" r:id="rId10"/>
-    <p:sldId id="262" r:id="rId11"/>
-    <p:sldId id="263" r:id="rId12"/>
-    <p:sldId id="258" r:id="rId13"/>
+    <p:sldId id="269" r:id="rId11"/>
+    <p:sldId id="268" r:id="rId12"/>
+    <p:sldId id="262" r:id="rId13"/>
+    <p:sldId id="263" r:id="rId14"/>
+    <p:sldId id="258" r:id="rId15"/>
   </p:sldIdLst>
   <p:sldSz cx="12192000" cy="6858000"/>
   <p:notesSz cx="6858000" cy="9144000"/>
@@ -126,7 +128,7 @@
 <file path=ppt/revisionInfo.xml><?xml version="1.0" encoding="utf-8"?>
 <p1510:revInfo xmlns:a="http://schemas.openxmlformats.org/drawingml/2006/main" xmlns:r="http://schemas.openxmlformats.org/officeDocument/2006/relationships" xmlns:p1510="http://schemas.microsoft.com/office/powerpoint/2015/10/main">
   <p1510:revLst>
-    <p1510:client id="{96D5EAEA-A849-41AF-B996-C6EDD6C3A444}" v="898" dt="2018-07-23T18:16:03.112"/>
+    <p1510:client id="{96D5EAEA-A849-41AF-B996-C6EDD6C3A444}" v="969" dt="2018-07-23T18:29:37.458"/>
   </p1510:revLst>
 </p1510:revInfo>
 </file>
@@ -136,7 +138,7 @@
   <pc:docChgLst>
     <pc:chgData name="Hyun Suk Shin (SEATTLE MTC)" userId="066a5242-16bf-4435-a097-69b4e8274bba" providerId="ADAL" clId="{96D5EAEA-A849-41AF-B996-C6EDD6C3A444}"/>
     <pc:docChg chg="undo redo custSel addSld delSld modSld sldOrd">
-      <pc:chgData name="Hyun Suk Shin (SEATTLE MTC)" userId="066a5242-16bf-4435-a097-69b4e8274bba" providerId="ADAL" clId="{96D5EAEA-A849-41AF-B996-C6EDD6C3A444}" dt="2018-07-23T18:16:03.112" v="877" actId="20577"/>
+      <pc:chgData name="Hyun Suk Shin (SEATTLE MTC)" userId="066a5242-16bf-4435-a097-69b4e8274bba" providerId="ADAL" clId="{96D5EAEA-A849-41AF-B996-C6EDD6C3A444}" dt="2018-07-23T18:29:37.458" v="946" actId="20577"/>
       <pc:docMkLst>
         <pc:docMk/>
       </pc:docMkLst>
@@ -1682,7 +1684,7 @@
         </pc:spChg>
       </pc:sldChg>
       <pc:sldChg chg="modSp add">
-        <pc:chgData name="Hyun Suk Shin (SEATTLE MTC)" userId="066a5242-16bf-4435-a097-69b4e8274bba" providerId="ADAL" clId="{96D5EAEA-A849-41AF-B996-C6EDD6C3A444}" dt="2018-07-23T18:15:24.042" v="849" actId="20577"/>
+        <pc:chgData name="Hyun Suk Shin (SEATTLE MTC)" userId="066a5242-16bf-4435-a097-69b4e8274bba" providerId="ADAL" clId="{96D5EAEA-A849-41AF-B996-C6EDD6C3A444}" dt="2018-07-23T18:20:42.201" v="878" actId="14861"/>
         <pc:sldMkLst>
           <pc:docMk/>
           <pc:sldMk cId="2129693626" sldId="265"/>
@@ -1695,9 +1697,17 @@
             <ac:spMk id="27" creationId="{9FAD1C9B-9C3D-4314-9768-59EAA2AA8BE1}"/>
           </ac:spMkLst>
         </pc:spChg>
+        <pc:spChg chg="mod">
+          <ac:chgData name="Hyun Suk Shin (SEATTLE MTC)" userId="066a5242-16bf-4435-a097-69b4e8274bba" providerId="ADAL" clId="{96D5EAEA-A849-41AF-B996-C6EDD6C3A444}" dt="2018-07-23T18:20:42.201" v="878" actId="14861"/>
+          <ac:spMkLst>
+            <pc:docMk/>
+            <pc:sldMk cId="2129693626" sldId="265"/>
+            <ac:spMk id="38" creationId="{55566AF0-5FE0-4EBC-9060-202D4531968F}"/>
+          </ac:spMkLst>
+        </pc:spChg>
       </pc:sldChg>
       <pc:sldChg chg="modSp add">
-        <pc:chgData name="Hyun Suk Shin (SEATTLE MTC)" userId="066a5242-16bf-4435-a097-69b4e8274bba" providerId="ADAL" clId="{96D5EAEA-A849-41AF-B996-C6EDD6C3A444}" dt="2018-07-23T18:15:48.870" v="865" actId="20577"/>
+        <pc:chgData name="Hyun Suk Shin (SEATTLE MTC)" userId="066a5242-16bf-4435-a097-69b4e8274bba" providerId="ADAL" clId="{96D5EAEA-A849-41AF-B996-C6EDD6C3A444}" dt="2018-07-23T18:20:45.515" v="879" actId="14861"/>
         <pc:sldMkLst>
           <pc:docMk/>
           <pc:sldMk cId="2868361510" sldId="266"/>
@@ -1710,9 +1720,17 @@
             <ac:spMk id="27" creationId="{9FAD1C9B-9C3D-4314-9768-59EAA2AA8BE1}"/>
           </ac:spMkLst>
         </pc:spChg>
+        <pc:spChg chg="mod">
+          <ac:chgData name="Hyun Suk Shin (SEATTLE MTC)" userId="066a5242-16bf-4435-a097-69b4e8274bba" providerId="ADAL" clId="{96D5EAEA-A849-41AF-B996-C6EDD6C3A444}" dt="2018-07-23T18:20:45.515" v="879" actId="14861"/>
+          <ac:spMkLst>
+            <pc:docMk/>
+            <pc:sldMk cId="2868361510" sldId="266"/>
+            <ac:spMk id="38" creationId="{55566AF0-5FE0-4EBC-9060-202D4531968F}"/>
+          </ac:spMkLst>
+        </pc:spChg>
       </pc:sldChg>
       <pc:sldChg chg="modSp add">
-        <pc:chgData name="Hyun Suk Shin (SEATTLE MTC)" userId="066a5242-16bf-4435-a097-69b4e8274bba" providerId="ADAL" clId="{96D5EAEA-A849-41AF-B996-C6EDD6C3A444}" dt="2018-07-23T18:16:03.112" v="877" actId="20577"/>
+        <pc:chgData name="Hyun Suk Shin (SEATTLE MTC)" userId="066a5242-16bf-4435-a097-69b4e8274bba" providerId="ADAL" clId="{96D5EAEA-A849-41AF-B996-C6EDD6C3A444}" dt="2018-07-23T18:20:48.953" v="880" actId="14861"/>
         <pc:sldMkLst>
           <pc:docMk/>
           <pc:sldMk cId="1619332029" sldId="267"/>
@@ -1725,6 +1743,172 @@
             <ac:spMk id="27" creationId="{9FAD1C9B-9C3D-4314-9768-59EAA2AA8BE1}"/>
           </ac:spMkLst>
         </pc:spChg>
+        <pc:spChg chg="mod">
+          <ac:chgData name="Hyun Suk Shin (SEATTLE MTC)" userId="066a5242-16bf-4435-a097-69b4e8274bba" providerId="ADAL" clId="{96D5EAEA-A849-41AF-B996-C6EDD6C3A444}" dt="2018-07-23T18:20:48.953" v="880" actId="14861"/>
+          <ac:spMkLst>
+            <pc:docMk/>
+            <pc:sldMk cId="1619332029" sldId="267"/>
+            <ac:spMk id="38" creationId="{55566AF0-5FE0-4EBC-9060-202D4531968F}"/>
+          </ac:spMkLst>
+        </pc:spChg>
+      </pc:sldChg>
+      <pc:sldChg chg="addSp delSp modSp add">
+        <pc:chgData name="Hyun Suk Shin (SEATTLE MTC)" userId="066a5242-16bf-4435-a097-69b4e8274bba" providerId="ADAL" clId="{96D5EAEA-A849-41AF-B996-C6EDD6C3A444}" dt="2018-07-23T18:29:32.500" v="942" actId="20577"/>
+        <pc:sldMkLst>
+          <pc:docMk/>
+          <pc:sldMk cId="1848362082" sldId="268"/>
+        </pc:sldMkLst>
+        <pc:spChg chg="mod">
+          <ac:chgData name="Hyun Suk Shin (SEATTLE MTC)" userId="066a5242-16bf-4435-a097-69b4e8274bba" providerId="ADAL" clId="{96D5EAEA-A849-41AF-B996-C6EDD6C3A444}" dt="2018-07-23T18:29:32.500" v="942" actId="20577"/>
+          <ac:spMkLst>
+            <pc:docMk/>
+            <pc:sldMk cId="1848362082" sldId="268"/>
+            <ac:spMk id="27" creationId="{9FAD1C9B-9C3D-4314-9768-59EAA2AA8BE1}"/>
+          </ac:spMkLst>
+        </pc:spChg>
+        <pc:spChg chg="add mod">
+          <ac:chgData name="Hyun Suk Shin (SEATTLE MTC)" userId="066a5242-16bf-4435-a097-69b4e8274bba" providerId="ADAL" clId="{96D5EAEA-A849-41AF-B996-C6EDD6C3A444}" dt="2018-07-23T18:23:47.601" v="928" actId="208"/>
+          <ac:spMkLst>
+            <pc:docMk/>
+            <pc:sldMk cId="1848362082" sldId="268"/>
+            <ac:spMk id="37" creationId="{F6DE6E2F-F7BF-4B7F-B1DB-BF9382AF29DC}"/>
+          </ac:spMkLst>
+        </pc:spChg>
+        <pc:spChg chg="del">
+          <ac:chgData name="Hyun Suk Shin (SEATTLE MTC)" userId="066a5242-16bf-4435-a097-69b4e8274bba" providerId="ADAL" clId="{96D5EAEA-A849-41AF-B996-C6EDD6C3A444}" dt="2018-07-23T18:22:21.204" v="903" actId="478"/>
+          <ac:spMkLst>
+            <pc:docMk/>
+            <pc:sldMk cId="1848362082" sldId="268"/>
+            <ac:spMk id="39" creationId="{47C4DD02-9651-4E20-9826-6BD468FCA5C2}"/>
+          </ac:spMkLst>
+        </pc:spChg>
+        <pc:spChg chg="add mod">
+          <ac:chgData name="Hyun Suk Shin (SEATTLE MTC)" userId="066a5242-16bf-4435-a097-69b4e8274bba" providerId="ADAL" clId="{96D5EAEA-A849-41AF-B996-C6EDD6C3A444}" dt="2018-07-23T18:21:42.087" v="894" actId="164"/>
+          <ac:spMkLst>
+            <pc:docMk/>
+            <pc:sldMk cId="1848362082" sldId="268"/>
+            <ac:spMk id="42" creationId="{CED9E762-FD4E-4ABC-9BB2-8FE287CAB6EF}"/>
+          </ac:spMkLst>
+        </pc:spChg>
+        <pc:spChg chg="add del mod">
+          <ac:chgData name="Hyun Suk Shin (SEATTLE MTC)" userId="066a5242-16bf-4435-a097-69b4e8274bba" providerId="ADAL" clId="{96D5EAEA-A849-41AF-B996-C6EDD6C3A444}" dt="2018-07-23T18:22:05.948" v="901" actId="478"/>
+          <ac:spMkLst>
+            <pc:docMk/>
+            <pc:sldMk cId="1848362082" sldId="268"/>
+            <ac:spMk id="49" creationId="{BA2A4D43-2CC0-4157-BE92-532762BDE8DA}"/>
+          </ac:spMkLst>
+        </pc:spChg>
+        <pc:spChg chg="add mod">
+          <ac:chgData name="Hyun Suk Shin (SEATTLE MTC)" userId="066a5242-16bf-4435-a097-69b4e8274bba" providerId="ADAL" clId="{96D5EAEA-A849-41AF-B996-C6EDD6C3A444}" dt="2018-07-23T18:23:26.136" v="926" actId="1076"/>
+          <ac:spMkLst>
+            <pc:docMk/>
+            <pc:sldMk cId="1848362082" sldId="268"/>
+            <ac:spMk id="50" creationId="{29782F94-656D-45DC-91DA-7415F73D0D11}"/>
+          </ac:spMkLst>
+        </pc:spChg>
+        <pc:grpChg chg="add mod">
+          <ac:chgData name="Hyun Suk Shin (SEATTLE MTC)" userId="066a5242-16bf-4435-a097-69b4e8274bba" providerId="ADAL" clId="{96D5EAEA-A849-41AF-B996-C6EDD6C3A444}" dt="2018-07-23T18:21:44.657" v="895" actId="12789"/>
+          <ac:grpSpMkLst>
+            <pc:docMk/>
+            <pc:sldMk cId="1848362082" sldId="268"/>
+            <ac:grpSpMk id="3" creationId="{C13856E4-5F8A-4075-80A6-9AF876CAB532}"/>
+          </ac:grpSpMkLst>
+        </pc:grpChg>
+        <pc:picChg chg="del">
+          <ac:chgData name="Hyun Suk Shin (SEATTLE MTC)" userId="066a5242-16bf-4435-a097-69b4e8274bba" providerId="ADAL" clId="{96D5EAEA-A849-41AF-B996-C6EDD6C3A444}" dt="2018-07-23T18:22:21.204" v="903" actId="478"/>
+          <ac:picMkLst>
+            <pc:docMk/>
+            <pc:sldMk cId="1848362082" sldId="268"/>
+            <ac:picMk id="31" creationId="{7CCE9A3D-1112-44F2-BC5F-50A7486B6177}"/>
+          </ac:picMkLst>
+        </pc:picChg>
+        <pc:picChg chg="del">
+          <ac:chgData name="Hyun Suk Shin (SEATTLE MTC)" userId="066a5242-16bf-4435-a097-69b4e8274bba" providerId="ADAL" clId="{96D5EAEA-A849-41AF-B996-C6EDD6C3A444}" dt="2018-07-23T18:22:21.204" v="903" actId="478"/>
+          <ac:picMkLst>
+            <pc:docMk/>
+            <pc:sldMk cId="1848362082" sldId="268"/>
+            <ac:picMk id="33" creationId="{0530C0EB-04F0-49AA-8332-A8508EF081AF}"/>
+          </ac:picMkLst>
+        </pc:picChg>
+        <pc:picChg chg="add mod">
+          <ac:chgData name="Hyun Suk Shin (SEATTLE MTC)" userId="066a5242-16bf-4435-a097-69b4e8274bba" providerId="ADAL" clId="{96D5EAEA-A849-41AF-B996-C6EDD6C3A444}" dt="2018-07-23T18:28:11.657" v="938" actId="108"/>
+          <ac:picMkLst>
+            <pc:docMk/>
+            <pc:sldMk cId="1848362082" sldId="268"/>
+            <ac:picMk id="35" creationId="{1ACC2136-EF38-483C-A758-00C48AC1AA38}"/>
+          </ac:picMkLst>
+        </pc:picChg>
+        <pc:cxnChg chg="add mod">
+          <ac:chgData name="Hyun Suk Shin (SEATTLE MTC)" userId="066a5242-16bf-4435-a097-69b4e8274bba" providerId="ADAL" clId="{96D5EAEA-A849-41AF-B996-C6EDD6C3A444}" dt="2018-07-23T18:23:00.818" v="923" actId="13822"/>
+          <ac:cxnSpMkLst>
+            <pc:docMk/>
+            <pc:sldMk cId="1848362082" sldId="268"/>
+            <ac:cxnSpMk id="5" creationId="{B5B4AE7C-B3A3-47AC-B0A0-D484AC9EB38C}"/>
+          </ac:cxnSpMkLst>
+        </pc:cxnChg>
+      </pc:sldChg>
+      <pc:sldChg chg="delSp modSp add">
+        <pc:chgData name="Hyun Suk Shin (SEATTLE MTC)" userId="066a5242-16bf-4435-a097-69b4e8274bba" providerId="ADAL" clId="{96D5EAEA-A849-41AF-B996-C6EDD6C3A444}" dt="2018-07-23T18:29:37.458" v="946" actId="20577"/>
+        <pc:sldMkLst>
+          <pc:docMk/>
+          <pc:sldMk cId="3328696984" sldId="269"/>
+        </pc:sldMkLst>
+        <pc:spChg chg="mod">
+          <ac:chgData name="Hyun Suk Shin (SEATTLE MTC)" userId="066a5242-16bf-4435-a097-69b4e8274bba" providerId="ADAL" clId="{96D5EAEA-A849-41AF-B996-C6EDD6C3A444}" dt="2018-07-23T18:29:37.458" v="946" actId="20577"/>
+          <ac:spMkLst>
+            <pc:docMk/>
+            <pc:sldMk cId="3328696984" sldId="269"/>
+            <ac:spMk id="27" creationId="{9FAD1C9B-9C3D-4314-9768-59EAA2AA8BE1}"/>
+          </ac:spMkLst>
+        </pc:spChg>
+        <pc:spChg chg="del">
+          <ac:chgData name="Hyun Suk Shin (SEATTLE MTC)" userId="066a5242-16bf-4435-a097-69b4e8274bba" providerId="ADAL" clId="{96D5EAEA-A849-41AF-B996-C6EDD6C3A444}" dt="2018-07-23T18:25:49.257" v="930" actId="478"/>
+          <ac:spMkLst>
+            <pc:docMk/>
+            <pc:sldMk cId="3328696984" sldId="269"/>
+            <ac:spMk id="37" creationId="{F6DE6E2F-F7BF-4B7F-B1DB-BF9382AF29DC}"/>
+          </ac:spMkLst>
+        </pc:spChg>
+        <pc:spChg chg="mod">
+          <ac:chgData name="Hyun Suk Shin (SEATTLE MTC)" userId="066a5242-16bf-4435-a097-69b4e8274bba" providerId="ADAL" clId="{96D5EAEA-A849-41AF-B996-C6EDD6C3A444}" dt="2018-07-23T18:26:20.993" v="936" actId="14861"/>
+          <ac:spMkLst>
+            <pc:docMk/>
+            <pc:sldMk cId="3328696984" sldId="269"/>
+            <ac:spMk id="45" creationId="{5A057C04-D841-419C-A8DF-5D2268AD4661}"/>
+          </ac:spMkLst>
+        </pc:spChg>
+        <pc:spChg chg="del">
+          <ac:chgData name="Hyun Suk Shin (SEATTLE MTC)" userId="066a5242-16bf-4435-a097-69b4e8274bba" providerId="ADAL" clId="{96D5EAEA-A849-41AF-B996-C6EDD6C3A444}" dt="2018-07-23T18:26:04.710" v="934" actId="478"/>
+          <ac:spMkLst>
+            <pc:docMk/>
+            <pc:sldMk cId="3328696984" sldId="269"/>
+            <ac:spMk id="50" creationId="{29782F94-656D-45DC-91DA-7415F73D0D11}"/>
+          </ac:spMkLst>
+        </pc:spChg>
+        <pc:grpChg chg="del">
+          <ac:chgData name="Hyun Suk Shin (SEATTLE MTC)" userId="066a5242-16bf-4435-a097-69b4e8274bba" providerId="ADAL" clId="{96D5EAEA-A849-41AF-B996-C6EDD6C3A444}" dt="2018-07-23T18:25:49.257" v="930" actId="478"/>
+          <ac:grpSpMkLst>
+            <pc:docMk/>
+            <pc:sldMk cId="3328696984" sldId="269"/>
+            <ac:grpSpMk id="3" creationId="{C13856E4-5F8A-4075-80A6-9AF876CAB532}"/>
+          </ac:grpSpMkLst>
+        </pc:grpChg>
+        <pc:picChg chg="mod">
+          <ac:chgData name="Hyun Suk Shin (SEATTLE MTC)" userId="066a5242-16bf-4435-a097-69b4e8274bba" providerId="ADAL" clId="{96D5EAEA-A849-41AF-B996-C6EDD6C3A444}" dt="2018-07-23T18:26:20.993" v="936" actId="14861"/>
+          <ac:picMkLst>
+            <pc:docMk/>
+            <pc:sldMk cId="3328696984" sldId="269"/>
+            <ac:picMk id="26" creationId="{68C0C0E7-82C5-4496-80C7-70B48D5FCCA2}"/>
+          </ac:picMkLst>
+        </pc:picChg>
+        <pc:cxnChg chg="del mod">
+          <ac:chgData name="Hyun Suk Shin (SEATTLE MTC)" userId="066a5242-16bf-4435-a097-69b4e8274bba" providerId="ADAL" clId="{96D5EAEA-A849-41AF-B996-C6EDD6C3A444}" dt="2018-07-23T18:26:11.027" v="935" actId="478"/>
+          <ac:cxnSpMkLst>
+            <pc:docMk/>
+            <pc:sldMk cId="3328696984" sldId="269"/>
+            <ac:cxnSpMk id="5" creationId="{B5B4AE7C-B3A3-47AC-B0A0-D484AC9EB38C}"/>
+          </ac:cxnSpMkLst>
+        </pc:cxnChg>
       </pc:sldChg>
     </pc:docChg>
   </pc:docChgLst>
@@ -3317,6 +3501,2000 @@
 </file>
 
 <file path=ppt/slides/slide10.xml><?xml version="1.0" encoding="utf-8"?>
+<p:sld xmlns:a="http://schemas.openxmlformats.org/drawingml/2006/main" xmlns:r="http://schemas.openxmlformats.org/officeDocument/2006/relationships" xmlns:p="http://schemas.openxmlformats.org/presentationml/2006/main">
+  <p:cSld>
+    <p:spTree>
+      <p:nvGrpSpPr>
+        <p:cNvPr id="1" name=""/>
+        <p:cNvGrpSpPr/>
+        <p:nvPr/>
+      </p:nvGrpSpPr>
+      <p:grpSpPr>
+        <a:xfrm>
+          <a:off x="0" y="0"/>
+          <a:ext cx="0" cy="0"/>
+          <a:chOff x="0" y="0"/>
+          <a:chExt cx="0" cy="0"/>
+        </a:xfrm>
+      </p:grpSpPr>
+      <p:sp>
+        <p:nvSpPr>
+          <p:cNvPr id="2" name="Title 1">
+            <a:extLst>
+              <a:ext uri="{FF2B5EF4-FFF2-40B4-BE49-F238E27FC236}">
+                <a16:creationId xmlns:a16="http://schemas.microsoft.com/office/drawing/2014/main" id="{55BEC068-2D76-4359-9DDC-45C48A0462D0}"/>
+              </a:ext>
+            </a:extLst>
+          </p:cNvPr>
+          <p:cNvSpPr>
+            <a:spLocks noGrp="1"/>
+          </p:cNvSpPr>
+          <p:nvPr>
+            <p:ph type="title"/>
+          </p:nvPr>
+        </p:nvSpPr>
+        <p:spPr/>
+        <p:txBody>
+          <a:bodyPr/>
+          <a:lstStyle/>
+          <a:p>
+            <a:r>
+              <a:rPr lang="en-US"/>
+              <a:t>Azure Machine Learning Workbench Hand on lab</a:t>
+            </a:r>
+            <a:endParaRPr lang="en-US" dirty="0"/>
+          </a:p>
+        </p:txBody>
+      </p:sp>
+      <p:sp>
+        <p:nvSpPr>
+          <p:cNvPr id="27" name="Text Placeholder 26">
+            <a:extLst>
+              <a:ext uri="{FF2B5EF4-FFF2-40B4-BE49-F238E27FC236}">
+                <a16:creationId xmlns:a16="http://schemas.microsoft.com/office/drawing/2014/main" id="{9FAD1C9B-9C3D-4314-9768-59EAA2AA8BE1}"/>
+              </a:ext>
+            </a:extLst>
+          </p:cNvPr>
+          <p:cNvSpPr>
+            <a:spLocks noGrp="1"/>
+          </p:cNvSpPr>
+          <p:nvPr>
+            <p:ph type="body" sz="quarter" idx="10"/>
+          </p:nvPr>
+        </p:nvSpPr>
+        <p:spPr/>
+        <p:txBody>
+          <a:bodyPr/>
+          <a:lstStyle/>
+          <a:p>
+            <a:r>
+              <a:rPr lang="en-US" dirty="0"/>
+              <a:t>06. </a:t>
+            </a:r>
+            <a:r>
+              <a:rPr lang="en-US"/>
+              <a:t>Model Selection</a:t>
+            </a:r>
+            <a:endParaRPr lang="en-US" dirty="0"/>
+          </a:p>
+        </p:txBody>
+      </p:sp>
+      <p:pic>
+        <p:nvPicPr>
+          <p:cNvPr id="15" name="Picture 14" descr="A close up of a logo&#10;&#10;Description generated with very high confidence">
+            <a:extLst>
+              <a:ext uri="{FF2B5EF4-FFF2-40B4-BE49-F238E27FC236}">
+                <a16:creationId xmlns:a16="http://schemas.microsoft.com/office/drawing/2014/main" id="{2007F6F4-2130-4914-9755-F8D37946A766}"/>
+              </a:ext>
+            </a:extLst>
+          </p:cNvPr>
+          <p:cNvPicPr>
+            <a:picLocks noChangeAspect="1"/>
+          </p:cNvPicPr>
+          <p:nvPr/>
+        </p:nvPicPr>
+        <p:blipFill>
+          <a:blip r:embed="rId2">
+            <a:extLst>
+              <a:ext uri="{28A0092B-C50C-407E-A947-70E740481C1C}">
+                <a14:useLocalDpi xmlns:a14="http://schemas.microsoft.com/office/drawing/2010/main" val="0"/>
+              </a:ext>
+            </a:extLst>
+          </a:blip>
+          <a:stretch>
+            <a:fillRect/>
+          </a:stretch>
+        </p:blipFill>
+        <p:spPr>
+          <a:xfrm>
+            <a:off x="2499029" y="2253848"/>
+            <a:ext cx="780290" cy="780290"/>
+          </a:xfrm>
+          <a:prstGeom prst="rect">
+            <a:avLst/>
+          </a:prstGeom>
+        </p:spPr>
+      </p:pic>
+      <p:pic>
+        <p:nvPicPr>
+          <p:cNvPr id="17" name="Picture 16">
+            <a:extLst>
+              <a:ext uri="{FF2B5EF4-FFF2-40B4-BE49-F238E27FC236}">
+                <a16:creationId xmlns:a16="http://schemas.microsoft.com/office/drawing/2014/main" id="{16868A53-090F-42D7-A992-4E4D30E6ED07}"/>
+              </a:ext>
+            </a:extLst>
+          </p:cNvPr>
+          <p:cNvPicPr>
+            <a:picLocks noChangeAspect="1"/>
+          </p:cNvPicPr>
+          <p:nvPr/>
+        </p:nvPicPr>
+        <p:blipFill>
+          <a:blip r:embed="rId3">
+            <a:clrChange>
+              <a:clrFrom>
+                <a:srgbClr val="252525"/>
+              </a:clrFrom>
+              <a:clrTo>
+                <a:srgbClr val="252525">
+                  <a:alpha val="0"/>
+                </a:srgbClr>
+              </a:clrTo>
+            </a:clrChange>
+          </a:blip>
+          <a:stretch>
+            <a:fillRect/>
+          </a:stretch>
+        </p:blipFill>
+        <p:spPr>
+          <a:xfrm>
+            <a:off x="3866260" y="2233552"/>
+            <a:ext cx="1113693" cy="1130566"/>
+          </a:xfrm>
+          <a:prstGeom prst="rect">
+            <a:avLst/>
+          </a:prstGeom>
+        </p:spPr>
+      </p:pic>
+      <p:pic>
+        <p:nvPicPr>
+          <p:cNvPr id="19" name="Picture 18">
+            <a:extLst>
+              <a:ext uri="{FF2B5EF4-FFF2-40B4-BE49-F238E27FC236}">
+                <a16:creationId xmlns:a16="http://schemas.microsoft.com/office/drawing/2014/main" id="{5D738062-E1AF-4C40-8F91-67FBAF723C95}"/>
+              </a:ext>
+            </a:extLst>
+          </p:cNvPr>
+          <p:cNvPicPr>
+            <a:picLocks noChangeAspect="1"/>
+          </p:cNvPicPr>
+          <p:nvPr/>
+        </p:nvPicPr>
+        <p:blipFill>
+          <a:blip r:embed="rId4">
+            <a:clrChange>
+              <a:clrFrom>
+                <a:srgbClr val="252525"/>
+              </a:clrFrom>
+              <a:clrTo>
+                <a:srgbClr val="252525">
+                  <a:alpha val="0"/>
+                </a:srgbClr>
+              </a:clrTo>
+            </a:clrChange>
+          </a:blip>
+          <a:stretch>
+            <a:fillRect/>
+          </a:stretch>
+        </p:blipFill>
+        <p:spPr>
+          <a:xfrm>
+            <a:off x="5387062" y="2340309"/>
+            <a:ext cx="1113693" cy="965199"/>
+          </a:xfrm>
+          <a:prstGeom prst="rect">
+            <a:avLst/>
+          </a:prstGeom>
+        </p:spPr>
+      </p:pic>
+      <p:pic>
+        <p:nvPicPr>
+          <p:cNvPr id="26" name="Picture 8" descr="Image result for docker">
+            <a:extLst>
+              <a:ext uri="{FF2B5EF4-FFF2-40B4-BE49-F238E27FC236}">
+                <a16:creationId xmlns:a16="http://schemas.microsoft.com/office/drawing/2014/main" id="{68C0C0E7-82C5-4496-80C7-70B48D5FCCA2}"/>
+              </a:ext>
+            </a:extLst>
+          </p:cNvPr>
+          <p:cNvPicPr>
+            <a:picLocks noChangeAspect="1" noChangeArrowheads="1"/>
+          </p:cNvPicPr>
+          <p:nvPr/>
+        </p:nvPicPr>
+        <p:blipFill>
+          <a:blip r:embed="rId5" cstate="print">
+            <a:extLst>
+              <a:ext uri="{28A0092B-C50C-407E-A947-70E740481C1C}">
+                <a14:useLocalDpi xmlns:a14="http://schemas.microsoft.com/office/drawing/2010/main" val="0"/>
+              </a:ext>
+            </a:extLst>
+          </a:blip>
+          <a:srcRect/>
+          <a:stretch>
+            <a:fillRect/>
+          </a:stretch>
+        </p:blipFill>
+        <p:spPr bwMode="auto">
+          <a:xfrm>
+            <a:off x="4480557" y="3746875"/>
+            <a:ext cx="576889" cy="431059"/>
+          </a:xfrm>
+          <a:prstGeom prst="rect">
+            <a:avLst/>
+          </a:prstGeom>
+          <a:noFill/>
+          <a:effectLst>
+            <a:glow rad="228600">
+              <a:schemeClr val="accent2">
+                <a:satMod val="175000"/>
+                <a:alpha val="40000"/>
+              </a:schemeClr>
+            </a:glow>
+          </a:effectLst>
+          <a:extLst>
+            <a:ext uri="{909E8E84-426E-40DD-AFC4-6F175D3DCCD1}">
+              <a14:hiddenFill xmlns:a14="http://schemas.microsoft.com/office/drawing/2010/main">
+                <a:solidFill>
+                  <a:srgbClr val="FFFFFF"/>
+                </a:solidFill>
+              </a14:hiddenFill>
+            </a:ext>
+          </a:extLst>
+        </p:spPr>
+      </p:pic>
+      <p:pic>
+        <p:nvPicPr>
+          <p:cNvPr id="28" name="Picture 10" descr="https://ms-toolsai.gallerycdn.vsassets.io/extensions/ms-toolsai/vscode-ai/0.1.2/1507534591592/Microsoft.VisualStudio.Services.Icons.Default">
+            <a:extLst>
+              <a:ext uri="{FF2B5EF4-FFF2-40B4-BE49-F238E27FC236}">
+                <a16:creationId xmlns:a16="http://schemas.microsoft.com/office/drawing/2014/main" id="{8743FFAC-B98A-4C85-BD9F-FAE020A10968}"/>
+              </a:ext>
+            </a:extLst>
+          </p:cNvPr>
+          <p:cNvPicPr>
+            <a:picLocks noChangeAspect="1" noChangeArrowheads="1"/>
+          </p:cNvPicPr>
+          <p:nvPr/>
+        </p:nvPicPr>
+        <p:blipFill>
+          <a:blip r:embed="rId6" cstate="print">
+            <a:extLst>
+              <a:ext uri="{28A0092B-C50C-407E-A947-70E740481C1C}">
+                <a14:useLocalDpi xmlns:a14="http://schemas.microsoft.com/office/drawing/2010/main" val="0"/>
+              </a:ext>
+            </a:extLst>
+          </a:blip>
+          <a:srcRect/>
+          <a:stretch>
+            <a:fillRect/>
+          </a:stretch>
+        </p:blipFill>
+        <p:spPr bwMode="auto">
+          <a:xfrm>
+            <a:off x="5345808" y="3660305"/>
+            <a:ext cx="543352" cy="543352"/>
+          </a:xfrm>
+          <a:prstGeom prst="rect">
+            <a:avLst/>
+          </a:prstGeom>
+          <a:noFill/>
+          <a:extLst>
+            <a:ext uri="{909E8E84-426E-40DD-AFC4-6F175D3DCCD1}">
+              <a14:hiddenFill xmlns:a14="http://schemas.microsoft.com/office/drawing/2010/main">
+                <a:solidFill>
+                  <a:srgbClr val="FFFFFF"/>
+                </a:solidFill>
+              </a14:hiddenFill>
+            </a:ext>
+          </a:extLst>
+        </p:spPr>
+      </p:pic>
+      <p:pic>
+        <p:nvPicPr>
+          <p:cNvPr id="29" name="Picture 28">
+            <a:extLst>
+              <a:ext uri="{FF2B5EF4-FFF2-40B4-BE49-F238E27FC236}">
+                <a16:creationId xmlns:a16="http://schemas.microsoft.com/office/drawing/2014/main" id="{9505837B-1FD6-4DC8-BEED-8132BCCDE6B8}"/>
+              </a:ext>
+            </a:extLst>
+          </p:cNvPr>
+          <p:cNvPicPr>
+            <a:picLocks noChangeAspect="1"/>
+          </p:cNvPicPr>
+          <p:nvPr/>
+        </p:nvPicPr>
+        <p:blipFill>
+          <a:blip r:embed="rId7">
+            <a:extLst>
+              <a:ext uri="{28A0092B-C50C-407E-A947-70E740481C1C}">
+                <a14:useLocalDpi xmlns:a14="http://schemas.microsoft.com/office/drawing/2010/main" val="0"/>
+              </a:ext>
+            </a:extLst>
+          </a:blip>
+          <a:stretch>
+            <a:fillRect/>
+          </a:stretch>
+        </p:blipFill>
+        <p:spPr>
+          <a:xfrm>
+            <a:off x="4829971" y="5381429"/>
+            <a:ext cx="780290" cy="780290"/>
+          </a:xfrm>
+          <a:prstGeom prst="rect">
+            <a:avLst/>
+          </a:prstGeom>
+        </p:spPr>
+      </p:pic>
+      <p:pic>
+        <p:nvPicPr>
+          <p:cNvPr id="30" name="Picture 29" descr="A picture containing electronics, display&#10;&#10;Description generated with very high confidence">
+            <a:extLst>
+              <a:ext uri="{FF2B5EF4-FFF2-40B4-BE49-F238E27FC236}">
+                <a16:creationId xmlns:a16="http://schemas.microsoft.com/office/drawing/2014/main" id="{CC2D5152-F8C8-47D9-971F-8DE6FDD8CD9E}"/>
+              </a:ext>
+            </a:extLst>
+          </p:cNvPr>
+          <p:cNvPicPr>
+            <a:picLocks noChangeAspect="1"/>
+          </p:cNvPicPr>
+          <p:nvPr/>
+        </p:nvPicPr>
+        <p:blipFill>
+          <a:blip r:embed="rId8">
+            <a:extLst>
+              <a:ext uri="{28A0092B-C50C-407E-A947-70E740481C1C}">
+                <a14:useLocalDpi xmlns:a14="http://schemas.microsoft.com/office/drawing/2010/main" val="0"/>
+              </a:ext>
+            </a:extLst>
+          </a:blip>
+          <a:stretch>
+            <a:fillRect/>
+          </a:stretch>
+        </p:blipFill>
+        <p:spPr>
+          <a:xfrm>
+            <a:off x="4807102" y="4485018"/>
+            <a:ext cx="780290" cy="780290"/>
+          </a:xfrm>
+          <a:prstGeom prst="rect">
+            <a:avLst/>
+          </a:prstGeom>
+        </p:spPr>
+      </p:pic>
+      <p:sp>
+        <p:nvSpPr>
+          <p:cNvPr id="32" name="Rectangle 31">
+            <a:extLst>
+              <a:ext uri="{FF2B5EF4-FFF2-40B4-BE49-F238E27FC236}">
+                <a16:creationId xmlns:a16="http://schemas.microsoft.com/office/drawing/2014/main" id="{0448F38F-6307-436E-9149-D83856B50602}"/>
+              </a:ext>
+            </a:extLst>
+          </p:cNvPr>
+          <p:cNvSpPr/>
+          <p:nvPr/>
+        </p:nvSpPr>
+        <p:spPr>
+          <a:xfrm>
+            <a:off x="2241096" y="1302203"/>
+            <a:ext cx="8960304" cy="5229225"/>
+          </a:xfrm>
+          <a:prstGeom prst="rect">
+            <a:avLst/>
+          </a:prstGeom>
+          <a:noFill/>
+        </p:spPr>
+        <p:style>
+          <a:lnRef idx="2">
+            <a:schemeClr val="accent1">
+              <a:shade val="50000"/>
+            </a:schemeClr>
+          </a:lnRef>
+          <a:fillRef idx="1">
+            <a:schemeClr val="accent1"/>
+          </a:fillRef>
+          <a:effectRef idx="0">
+            <a:schemeClr val="accent1"/>
+          </a:effectRef>
+          <a:fontRef idx="minor">
+            <a:schemeClr val="lt1"/>
+          </a:fontRef>
+        </p:style>
+        <p:txBody>
+          <a:bodyPr rtlCol="0" anchor="ctr"/>
+          <a:lstStyle/>
+          <a:p>
+            <a:pPr algn="ctr"/>
+            <a:endParaRPr lang="en-US"/>
+          </a:p>
+        </p:txBody>
+      </p:sp>
+      <p:sp>
+        <p:nvSpPr>
+          <p:cNvPr id="34" name="Rectangle 33">
+            <a:extLst>
+              <a:ext uri="{FF2B5EF4-FFF2-40B4-BE49-F238E27FC236}">
+                <a16:creationId xmlns:a16="http://schemas.microsoft.com/office/drawing/2014/main" id="{FBB51523-8CDF-4033-92C7-CF0E2771BEB5}"/>
+              </a:ext>
+            </a:extLst>
+          </p:cNvPr>
+          <p:cNvSpPr/>
+          <p:nvPr/>
+        </p:nvSpPr>
+        <p:spPr>
+          <a:xfrm>
+            <a:off x="3620861" y="1902461"/>
+            <a:ext cx="3198510" cy="4347300"/>
+          </a:xfrm>
+          <a:prstGeom prst="rect">
+            <a:avLst/>
+          </a:prstGeom>
+          <a:noFill/>
+          <a:ln>
+            <a:solidFill>
+              <a:schemeClr val="bg1">
+                <a:lumMod val="50000"/>
+              </a:schemeClr>
+            </a:solidFill>
+          </a:ln>
+        </p:spPr>
+        <p:style>
+          <a:lnRef idx="2">
+            <a:schemeClr val="accent1">
+              <a:shade val="50000"/>
+            </a:schemeClr>
+          </a:lnRef>
+          <a:fillRef idx="1">
+            <a:schemeClr val="accent1"/>
+          </a:fillRef>
+          <a:effectRef idx="0">
+            <a:schemeClr val="accent1"/>
+          </a:effectRef>
+          <a:fontRef idx="minor">
+            <a:schemeClr val="lt1"/>
+          </a:fontRef>
+        </p:style>
+        <p:txBody>
+          <a:bodyPr rtlCol="0" anchor="ctr"/>
+          <a:lstStyle/>
+          <a:p>
+            <a:pPr algn="ctr"/>
+            <a:endParaRPr lang="en-US"/>
+          </a:p>
+        </p:txBody>
+      </p:sp>
+      <p:pic>
+        <p:nvPicPr>
+          <p:cNvPr id="36" name="Picture 35" descr="A picture containing furniture, table&#10;&#10;Description generated with high confidence">
+            <a:extLst>
+              <a:ext uri="{FF2B5EF4-FFF2-40B4-BE49-F238E27FC236}">
+                <a16:creationId xmlns:a16="http://schemas.microsoft.com/office/drawing/2014/main" id="{2840701B-79E8-4F4D-A9CC-891BAC3D782F}"/>
+              </a:ext>
+            </a:extLst>
+          </p:cNvPr>
+          <p:cNvPicPr>
+            <a:picLocks noChangeAspect="1"/>
+          </p:cNvPicPr>
+          <p:nvPr/>
+        </p:nvPicPr>
+        <p:blipFill>
+          <a:blip r:embed="rId9">
+            <a:extLst>
+              <a:ext uri="{28A0092B-C50C-407E-A947-70E740481C1C}">
+                <a14:useLocalDpi xmlns:a14="http://schemas.microsoft.com/office/drawing/2010/main" val="0"/>
+              </a:ext>
+            </a:extLst>
+          </a:blip>
+          <a:stretch>
+            <a:fillRect/>
+          </a:stretch>
+        </p:blipFill>
+        <p:spPr>
+          <a:xfrm>
+            <a:off x="3230716" y="1512316"/>
+            <a:ext cx="780290" cy="780290"/>
+          </a:xfrm>
+          <a:prstGeom prst="rect">
+            <a:avLst/>
+          </a:prstGeom>
+          <a:solidFill>
+            <a:schemeClr val="bg1"/>
+          </a:solidFill>
+        </p:spPr>
+      </p:pic>
+      <p:sp>
+        <p:nvSpPr>
+          <p:cNvPr id="38" name="Rectangle 37">
+            <a:extLst>
+              <a:ext uri="{FF2B5EF4-FFF2-40B4-BE49-F238E27FC236}">
+                <a16:creationId xmlns:a16="http://schemas.microsoft.com/office/drawing/2014/main" id="{55566AF0-5FE0-4EBC-9060-202D4531968F}"/>
+              </a:ext>
+            </a:extLst>
+          </p:cNvPr>
+          <p:cNvSpPr/>
+          <p:nvPr/>
+        </p:nvSpPr>
+        <p:spPr>
+          <a:xfrm>
+            <a:off x="4298495" y="3564783"/>
+            <a:ext cx="1797505" cy="1901151"/>
+          </a:xfrm>
+          <a:prstGeom prst="rect">
+            <a:avLst/>
+          </a:prstGeom>
+          <a:noFill/>
+          <a:ln w="38100">
+            <a:solidFill>
+              <a:schemeClr val="bg1">
+                <a:lumMod val="75000"/>
+              </a:schemeClr>
+            </a:solidFill>
+            <a:prstDash val="dash"/>
+          </a:ln>
+          <a:effectLst>
+            <a:glow rad="63500">
+              <a:schemeClr val="accent4">
+                <a:satMod val="175000"/>
+                <a:alpha val="40000"/>
+              </a:schemeClr>
+            </a:glow>
+          </a:effectLst>
+        </p:spPr>
+        <p:style>
+          <a:lnRef idx="2">
+            <a:schemeClr val="accent1">
+              <a:shade val="50000"/>
+            </a:schemeClr>
+          </a:lnRef>
+          <a:fillRef idx="1">
+            <a:schemeClr val="accent1"/>
+          </a:fillRef>
+          <a:effectRef idx="0">
+            <a:schemeClr val="accent1"/>
+          </a:effectRef>
+          <a:fontRef idx="minor">
+            <a:schemeClr val="lt1"/>
+          </a:fontRef>
+        </p:style>
+        <p:txBody>
+          <a:bodyPr rtlCol="0" anchor="ctr"/>
+          <a:lstStyle/>
+          <a:p>
+            <a:pPr algn="ctr"/>
+            <a:endParaRPr lang="en-US"/>
+          </a:p>
+        </p:txBody>
+      </p:sp>
+      <p:sp>
+        <p:nvSpPr>
+          <p:cNvPr id="40" name="TextBox 39">
+            <a:extLst>
+              <a:ext uri="{FF2B5EF4-FFF2-40B4-BE49-F238E27FC236}">
+                <a16:creationId xmlns:a16="http://schemas.microsoft.com/office/drawing/2014/main" id="{0FCF6837-D329-4B6A-8414-F08DC42355C5}"/>
+              </a:ext>
+            </a:extLst>
+          </p:cNvPr>
+          <p:cNvSpPr txBox="1"/>
+          <p:nvPr/>
+        </p:nvSpPr>
+        <p:spPr>
+          <a:xfrm>
+            <a:off x="2466109" y="3034138"/>
+            <a:ext cx="846129" cy="276999"/>
+          </a:xfrm>
+          <a:prstGeom prst="rect">
+            <a:avLst/>
+          </a:prstGeom>
+          <a:noFill/>
+        </p:spPr>
+        <p:txBody>
+          <a:bodyPr wrap="none" rtlCol="0">
+            <a:spAutoFit/>
+          </a:bodyPr>
+          <a:lstStyle/>
+          <a:p>
+            <a:pPr algn="ctr"/>
+            <a:r>
+              <a:rPr lang="en-US" sz="1200" dirty="0"/>
+              <a:t>Azure AD</a:t>
+            </a:r>
+          </a:p>
+        </p:txBody>
+      </p:sp>
+      <p:sp>
+        <p:nvSpPr>
+          <p:cNvPr id="41" name="TextBox 40">
+            <a:extLst>
+              <a:ext uri="{FF2B5EF4-FFF2-40B4-BE49-F238E27FC236}">
+                <a16:creationId xmlns:a16="http://schemas.microsoft.com/office/drawing/2014/main" id="{55B126C6-70F5-4088-BDB5-965D9E2190AA}"/>
+              </a:ext>
+            </a:extLst>
+          </p:cNvPr>
+          <p:cNvSpPr txBox="1"/>
+          <p:nvPr/>
+        </p:nvSpPr>
+        <p:spPr>
+          <a:xfrm>
+            <a:off x="4065909" y="1579826"/>
+            <a:ext cx="1485728" cy="276999"/>
+          </a:xfrm>
+          <a:prstGeom prst="rect">
+            <a:avLst/>
+          </a:prstGeom>
+          <a:noFill/>
+        </p:spPr>
+        <p:txBody>
+          <a:bodyPr wrap="none" rtlCol="0">
+            <a:spAutoFit/>
+          </a:bodyPr>
+          <a:lstStyle/>
+          <a:p>
+            <a:r>
+              <a:rPr lang="en-US" sz="1200" dirty="0" err="1"/>
+              <a:t>datascience</a:t>
+            </a:r>
+            <a:r>
+              <a:rPr lang="en-US" sz="1200" dirty="0"/>
+              <a:t>-hol-</a:t>
+            </a:r>
+            <a:r>
+              <a:rPr lang="en-US" sz="1200" dirty="0" err="1"/>
+              <a:t>rg</a:t>
+            </a:r>
+            <a:endParaRPr lang="en-US" sz="1200" dirty="0"/>
+          </a:p>
+        </p:txBody>
+      </p:sp>
+      <p:sp>
+        <p:nvSpPr>
+          <p:cNvPr id="43" name="TextBox 42">
+            <a:extLst>
+              <a:ext uri="{FF2B5EF4-FFF2-40B4-BE49-F238E27FC236}">
+                <a16:creationId xmlns:a16="http://schemas.microsoft.com/office/drawing/2014/main" id="{FF45A7C9-1F7E-471C-8FB4-A6A024F1AE00}"/>
+              </a:ext>
+            </a:extLst>
+          </p:cNvPr>
+          <p:cNvSpPr txBox="1"/>
+          <p:nvPr/>
+        </p:nvSpPr>
+        <p:spPr>
+          <a:xfrm>
+            <a:off x="3717624" y="3177010"/>
+            <a:ext cx="1410964" cy="253916"/>
+          </a:xfrm>
+          <a:prstGeom prst="rect">
+            <a:avLst/>
+          </a:prstGeom>
+          <a:noFill/>
+        </p:spPr>
+        <p:txBody>
+          <a:bodyPr wrap="none" rtlCol="0">
+            <a:spAutoFit/>
+          </a:bodyPr>
+          <a:lstStyle/>
+          <a:p>
+            <a:pPr algn="ctr"/>
+            <a:r>
+              <a:rPr lang="en-US" sz="1050" dirty="0"/>
+              <a:t>ML Experimentation</a:t>
+            </a:r>
+          </a:p>
+        </p:txBody>
+      </p:sp>
+      <p:sp>
+        <p:nvSpPr>
+          <p:cNvPr id="44" name="TextBox 43">
+            <a:extLst>
+              <a:ext uri="{FF2B5EF4-FFF2-40B4-BE49-F238E27FC236}">
+                <a16:creationId xmlns:a16="http://schemas.microsoft.com/office/drawing/2014/main" id="{E3FB9C2A-9D8D-4D5E-8BB1-6E76D1BE042D}"/>
+              </a:ext>
+            </a:extLst>
+          </p:cNvPr>
+          <p:cNvSpPr txBox="1"/>
+          <p:nvPr/>
+        </p:nvSpPr>
+        <p:spPr>
+          <a:xfrm>
+            <a:off x="4509398" y="5180764"/>
+            <a:ext cx="1375698" cy="276999"/>
+          </a:xfrm>
+          <a:prstGeom prst="rect">
+            <a:avLst/>
+          </a:prstGeom>
+          <a:noFill/>
+        </p:spPr>
+        <p:txBody>
+          <a:bodyPr wrap="none" rtlCol="0">
+            <a:spAutoFit/>
+          </a:bodyPr>
+          <a:lstStyle/>
+          <a:p>
+            <a:pPr algn="ctr"/>
+            <a:r>
+              <a:rPr lang="en-US" sz="1200" dirty="0"/>
+              <a:t>Data Science VM</a:t>
+            </a:r>
+          </a:p>
+        </p:txBody>
+      </p:sp>
+      <p:sp>
+        <p:nvSpPr>
+          <p:cNvPr id="45" name="TextBox 44">
+            <a:extLst>
+              <a:ext uri="{FF2B5EF4-FFF2-40B4-BE49-F238E27FC236}">
+                <a16:creationId xmlns:a16="http://schemas.microsoft.com/office/drawing/2014/main" id="{5A057C04-D841-419C-A8DF-5D2268AD4661}"/>
+              </a:ext>
+            </a:extLst>
+          </p:cNvPr>
+          <p:cNvSpPr txBox="1"/>
+          <p:nvPr/>
+        </p:nvSpPr>
+        <p:spPr>
+          <a:xfrm>
+            <a:off x="4441892" y="4186789"/>
+            <a:ext cx="654218" cy="276999"/>
+          </a:xfrm>
+          <a:prstGeom prst="rect">
+            <a:avLst/>
+          </a:prstGeom>
+          <a:noFill/>
+          <a:effectLst>
+            <a:glow rad="228600">
+              <a:schemeClr val="accent2">
+                <a:satMod val="175000"/>
+                <a:alpha val="40000"/>
+              </a:schemeClr>
+            </a:glow>
+          </a:effectLst>
+        </p:spPr>
+        <p:txBody>
+          <a:bodyPr wrap="none" rtlCol="0">
+            <a:spAutoFit/>
+          </a:bodyPr>
+          <a:lstStyle/>
+          <a:p>
+            <a:pPr algn="ctr"/>
+            <a:r>
+              <a:rPr lang="en-US" sz="1200" dirty="0"/>
+              <a:t>docker</a:t>
+            </a:r>
+          </a:p>
+        </p:txBody>
+      </p:sp>
+      <p:sp>
+        <p:nvSpPr>
+          <p:cNvPr id="46" name="TextBox 45">
+            <a:extLst>
+              <a:ext uri="{FF2B5EF4-FFF2-40B4-BE49-F238E27FC236}">
+                <a16:creationId xmlns:a16="http://schemas.microsoft.com/office/drawing/2014/main" id="{2263EAD3-5869-4A7C-BE4B-4D1F14EC4EA4}"/>
+              </a:ext>
+            </a:extLst>
+          </p:cNvPr>
+          <p:cNvSpPr txBox="1"/>
+          <p:nvPr/>
+        </p:nvSpPr>
+        <p:spPr>
+          <a:xfrm>
+            <a:off x="5127190" y="4186789"/>
+            <a:ext cx="980589" cy="276999"/>
+          </a:xfrm>
+          <a:prstGeom prst="rect">
+            <a:avLst/>
+          </a:prstGeom>
+          <a:noFill/>
+        </p:spPr>
+        <p:txBody>
+          <a:bodyPr wrap="none" rtlCol="0">
+            <a:spAutoFit/>
+          </a:bodyPr>
+          <a:lstStyle/>
+          <a:p>
+            <a:pPr algn="ctr"/>
+            <a:r>
+              <a:rPr lang="en-US" sz="1200" dirty="0"/>
+              <a:t>Workbench</a:t>
+            </a:r>
+          </a:p>
+        </p:txBody>
+      </p:sp>
+      <p:sp>
+        <p:nvSpPr>
+          <p:cNvPr id="47" name="TextBox 46">
+            <a:extLst>
+              <a:ext uri="{FF2B5EF4-FFF2-40B4-BE49-F238E27FC236}">
+                <a16:creationId xmlns:a16="http://schemas.microsoft.com/office/drawing/2014/main" id="{CF1BF90B-78D0-4D69-A9B5-2E512D58F302}"/>
+              </a:ext>
+            </a:extLst>
+          </p:cNvPr>
+          <p:cNvSpPr txBox="1"/>
+          <p:nvPr/>
+        </p:nvSpPr>
+        <p:spPr>
+          <a:xfrm>
+            <a:off x="5197550" y="3177010"/>
+            <a:ext cx="1492716" cy="261610"/>
+          </a:xfrm>
+          <a:prstGeom prst="rect">
+            <a:avLst/>
+          </a:prstGeom>
+          <a:noFill/>
+        </p:spPr>
+        <p:txBody>
+          <a:bodyPr wrap="none" rtlCol="0">
+            <a:spAutoFit/>
+          </a:bodyPr>
+          <a:lstStyle/>
+          <a:p>
+            <a:pPr algn="ctr"/>
+            <a:r>
+              <a:rPr lang="en-US" sz="1050" dirty="0"/>
+              <a:t>Model Management</a:t>
+            </a:r>
+          </a:p>
+        </p:txBody>
+      </p:sp>
+      <p:sp>
+        <p:nvSpPr>
+          <p:cNvPr id="48" name="TextBox 47">
+            <a:extLst>
+              <a:ext uri="{FF2B5EF4-FFF2-40B4-BE49-F238E27FC236}">
+                <a16:creationId xmlns:a16="http://schemas.microsoft.com/office/drawing/2014/main" id="{F92F720D-9835-497B-865A-E84821E9FDEF}"/>
+              </a:ext>
+            </a:extLst>
+          </p:cNvPr>
+          <p:cNvSpPr txBox="1"/>
+          <p:nvPr/>
+        </p:nvSpPr>
+        <p:spPr>
+          <a:xfrm>
+            <a:off x="4576574" y="5961397"/>
+            <a:ext cx="1287084" cy="276999"/>
+          </a:xfrm>
+          <a:prstGeom prst="rect">
+            <a:avLst/>
+          </a:prstGeom>
+          <a:noFill/>
+        </p:spPr>
+        <p:txBody>
+          <a:bodyPr wrap="none" rtlCol="0">
+            <a:spAutoFit/>
+          </a:bodyPr>
+          <a:lstStyle/>
+          <a:p>
+            <a:pPr algn="ctr"/>
+            <a:r>
+              <a:rPr lang="en-US" sz="1200" dirty="0"/>
+              <a:t>Virtual Network</a:t>
+            </a:r>
+          </a:p>
+        </p:txBody>
+      </p:sp>
+    </p:spTree>
+    <p:extLst>
+      <p:ext uri="{BB962C8B-B14F-4D97-AF65-F5344CB8AC3E}">
+        <p14:creationId xmlns:p14="http://schemas.microsoft.com/office/powerpoint/2010/main" val="3328696984"/>
+      </p:ext>
+    </p:extLst>
+  </p:cSld>
+  <p:clrMapOvr>
+    <a:masterClrMapping/>
+  </p:clrMapOvr>
+</p:sld>
+</file>
+
+<file path=ppt/slides/slide11.xml><?xml version="1.0" encoding="utf-8"?>
+<p:sld xmlns:a="http://schemas.openxmlformats.org/drawingml/2006/main" xmlns:r="http://schemas.openxmlformats.org/officeDocument/2006/relationships" xmlns:p="http://schemas.openxmlformats.org/presentationml/2006/main">
+  <p:cSld>
+    <p:spTree>
+      <p:nvGrpSpPr>
+        <p:cNvPr id="1" name=""/>
+        <p:cNvGrpSpPr/>
+        <p:nvPr/>
+      </p:nvGrpSpPr>
+      <p:grpSpPr>
+        <a:xfrm>
+          <a:off x="0" y="0"/>
+          <a:ext cx="0" cy="0"/>
+          <a:chOff x="0" y="0"/>
+          <a:chExt cx="0" cy="0"/>
+        </a:xfrm>
+      </p:grpSpPr>
+      <p:sp>
+        <p:nvSpPr>
+          <p:cNvPr id="2" name="Title 1">
+            <a:extLst>
+              <a:ext uri="{FF2B5EF4-FFF2-40B4-BE49-F238E27FC236}">
+                <a16:creationId xmlns:a16="http://schemas.microsoft.com/office/drawing/2014/main" id="{55BEC068-2D76-4359-9DDC-45C48A0462D0}"/>
+              </a:ext>
+            </a:extLst>
+          </p:cNvPr>
+          <p:cNvSpPr>
+            <a:spLocks noGrp="1"/>
+          </p:cNvSpPr>
+          <p:nvPr>
+            <p:ph type="title"/>
+          </p:nvPr>
+        </p:nvSpPr>
+        <p:spPr/>
+        <p:txBody>
+          <a:bodyPr/>
+          <a:lstStyle/>
+          <a:p>
+            <a:r>
+              <a:rPr lang="en-US"/>
+              <a:t>Azure Machine Learning Workbench Hand on lab</a:t>
+            </a:r>
+            <a:endParaRPr lang="en-US" dirty="0"/>
+          </a:p>
+        </p:txBody>
+      </p:sp>
+      <p:sp>
+        <p:nvSpPr>
+          <p:cNvPr id="27" name="Text Placeholder 26">
+            <a:extLst>
+              <a:ext uri="{FF2B5EF4-FFF2-40B4-BE49-F238E27FC236}">
+                <a16:creationId xmlns:a16="http://schemas.microsoft.com/office/drawing/2014/main" id="{9FAD1C9B-9C3D-4314-9768-59EAA2AA8BE1}"/>
+              </a:ext>
+            </a:extLst>
+          </p:cNvPr>
+          <p:cNvSpPr>
+            <a:spLocks noGrp="1"/>
+          </p:cNvSpPr>
+          <p:nvPr>
+            <p:ph type="body" sz="quarter" idx="10"/>
+          </p:nvPr>
+        </p:nvSpPr>
+        <p:spPr/>
+        <p:txBody>
+          <a:bodyPr/>
+          <a:lstStyle/>
+          <a:p>
+            <a:r>
+              <a:rPr lang="en-US" dirty="0"/>
+              <a:t>06. Model Selection</a:t>
+            </a:r>
+          </a:p>
+        </p:txBody>
+      </p:sp>
+      <p:pic>
+        <p:nvPicPr>
+          <p:cNvPr id="15" name="Picture 14" descr="A close up of a logo&#10;&#10;Description generated with very high confidence">
+            <a:extLst>
+              <a:ext uri="{FF2B5EF4-FFF2-40B4-BE49-F238E27FC236}">
+                <a16:creationId xmlns:a16="http://schemas.microsoft.com/office/drawing/2014/main" id="{2007F6F4-2130-4914-9755-F8D37946A766}"/>
+              </a:ext>
+            </a:extLst>
+          </p:cNvPr>
+          <p:cNvPicPr>
+            <a:picLocks noChangeAspect="1"/>
+          </p:cNvPicPr>
+          <p:nvPr/>
+        </p:nvPicPr>
+        <p:blipFill>
+          <a:blip r:embed="rId2">
+            <a:extLst>
+              <a:ext uri="{28A0092B-C50C-407E-A947-70E740481C1C}">
+                <a14:useLocalDpi xmlns:a14="http://schemas.microsoft.com/office/drawing/2010/main" val="0"/>
+              </a:ext>
+            </a:extLst>
+          </a:blip>
+          <a:stretch>
+            <a:fillRect/>
+          </a:stretch>
+        </p:blipFill>
+        <p:spPr>
+          <a:xfrm>
+            <a:off x="2499029" y="2253848"/>
+            <a:ext cx="780290" cy="780290"/>
+          </a:xfrm>
+          <a:prstGeom prst="rect">
+            <a:avLst/>
+          </a:prstGeom>
+        </p:spPr>
+      </p:pic>
+      <p:pic>
+        <p:nvPicPr>
+          <p:cNvPr id="17" name="Picture 16">
+            <a:extLst>
+              <a:ext uri="{FF2B5EF4-FFF2-40B4-BE49-F238E27FC236}">
+                <a16:creationId xmlns:a16="http://schemas.microsoft.com/office/drawing/2014/main" id="{16868A53-090F-42D7-A992-4E4D30E6ED07}"/>
+              </a:ext>
+            </a:extLst>
+          </p:cNvPr>
+          <p:cNvPicPr>
+            <a:picLocks noChangeAspect="1"/>
+          </p:cNvPicPr>
+          <p:nvPr/>
+        </p:nvPicPr>
+        <p:blipFill>
+          <a:blip r:embed="rId3">
+            <a:clrChange>
+              <a:clrFrom>
+                <a:srgbClr val="252525"/>
+              </a:clrFrom>
+              <a:clrTo>
+                <a:srgbClr val="252525">
+                  <a:alpha val="0"/>
+                </a:srgbClr>
+              </a:clrTo>
+            </a:clrChange>
+          </a:blip>
+          <a:stretch>
+            <a:fillRect/>
+          </a:stretch>
+        </p:blipFill>
+        <p:spPr>
+          <a:xfrm>
+            <a:off x="3866260" y="2233552"/>
+            <a:ext cx="1113693" cy="1130566"/>
+          </a:xfrm>
+          <a:prstGeom prst="rect">
+            <a:avLst/>
+          </a:prstGeom>
+        </p:spPr>
+      </p:pic>
+      <p:pic>
+        <p:nvPicPr>
+          <p:cNvPr id="19" name="Picture 18">
+            <a:extLst>
+              <a:ext uri="{FF2B5EF4-FFF2-40B4-BE49-F238E27FC236}">
+                <a16:creationId xmlns:a16="http://schemas.microsoft.com/office/drawing/2014/main" id="{5D738062-E1AF-4C40-8F91-67FBAF723C95}"/>
+              </a:ext>
+            </a:extLst>
+          </p:cNvPr>
+          <p:cNvPicPr>
+            <a:picLocks noChangeAspect="1"/>
+          </p:cNvPicPr>
+          <p:nvPr/>
+        </p:nvPicPr>
+        <p:blipFill>
+          <a:blip r:embed="rId4">
+            <a:clrChange>
+              <a:clrFrom>
+                <a:srgbClr val="252525"/>
+              </a:clrFrom>
+              <a:clrTo>
+                <a:srgbClr val="252525">
+                  <a:alpha val="0"/>
+                </a:srgbClr>
+              </a:clrTo>
+            </a:clrChange>
+          </a:blip>
+          <a:stretch>
+            <a:fillRect/>
+          </a:stretch>
+        </p:blipFill>
+        <p:spPr>
+          <a:xfrm>
+            <a:off x="5387062" y="2340309"/>
+            <a:ext cx="1113693" cy="965199"/>
+          </a:xfrm>
+          <a:prstGeom prst="rect">
+            <a:avLst/>
+          </a:prstGeom>
+        </p:spPr>
+      </p:pic>
+      <p:pic>
+        <p:nvPicPr>
+          <p:cNvPr id="26" name="Picture 8" descr="Image result for docker">
+            <a:extLst>
+              <a:ext uri="{FF2B5EF4-FFF2-40B4-BE49-F238E27FC236}">
+                <a16:creationId xmlns:a16="http://schemas.microsoft.com/office/drawing/2014/main" id="{68C0C0E7-82C5-4496-80C7-70B48D5FCCA2}"/>
+              </a:ext>
+            </a:extLst>
+          </p:cNvPr>
+          <p:cNvPicPr>
+            <a:picLocks noChangeAspect="1" noChangeArrowheads="1"/>
+          </p:cNvPicPr>
+          <p:nvPr/>
+        </p:nvPicPr>
+        <p:blipFill>
+          <a:blip r:embed="rId5" cstate="print">
+            <a:extLst>
+              <a:ext uri="{28A0092B-C50C-407E-A947-70E740481C1C}">
+                <a14:useLocalDpi xmlns:a14="http://schemas.microsoft.com/office/drawing/2010/main" val="0"/>
+              </a:ext>
+            </a:extLst>
+          </a:blip>
+          <a:srcRect/>
+          <a:stretch>
+            <a:fillRect/>
+          </a:stretch>
+        </p:blipFill>
+        <p:spPr bwMode="auto">
+          <a:xfrm>
+            <a:off x="4480557" y="3746875"/>
+            <a:ext cx="576889" cy="431059"/>
+          </a:xfrm>
+          <a:prstGeom prst="rect">
+            <a:avLst/>
+          </a:prstGeom>
+          <a:noFill/>
+          <a:extLst>
+            <a:ext uri="{909E8E84-426E-40DD-AFC4-6F175D3DCCD1}">
+              <a14:hiddenFill xmlns:a14="http://schemas.microsoft.com/office/drawing/2010/main">
+                <a:solidFill>
+                  <a:srgbClr val="FFFFFF"/>
+                </a:solidFill>
+              </a14:hiddenFill>
+            </a:ext>
+          </a:extLst>
+        </p:spPr>
+      </p:pic>
+      <p:pic>
+        <p:nvPicPr>
+          <p:cNvPr id="28" name="Picture 10" descr="https://ms-toolsai.gallerycdn.vsassets.io/extensions/ms-toolsai/vscode-ai/0.1.2/1507534591592/Microsoft.VisualStudio.Services.Icons.Default">
+            <a:extLst>
+              <a:ext uri="{FF2B5EF4-FFF2-40B4-BE49-F238E27FC236}">
+                <a16:creationId xmlns:a16="http://schemas.microsoft.com/office/drawing/2014/main" id="{8743FFAC-B98A-4C85-BD9F-FAE020A10968}"/>
+              </a:ext>
+            </a:extLst>
+          </p:cNvPr>
+          <p:cNvPicPr>
+            <a:picLocks noChangeAspect="1" noChangeArrowheads="1"/>
+          </p:cNvPicPr>
+          <p:nvPr/>
+        </p:nvPicPr>
+        <p:blipFill>
+          <a:blip r:embed="rId6" cstate="print">
+            <a:extLst>
+              <a:ext uri="{28A0092B-C50C-407E-A947-70E740481C1C}">
+                <a14:useLocalDpi xmlns:a14="http://schemas.microsoft.com/office/drawing/2010/main" val="0"/>
+              </a:ext>
+            </a:extLst>
+          </a:blip>
+          <a:srcRect/>
+          <a:stretch>
+            <a:fillRect/>
+          </a:stretch>
+        </p:blipFill>
+        <p:spPr bwMode="auto">
+          <a:xfrm>
+            <a:off x="5345808" y="3660305"/>
+            <a:ext cx="543352" cy="543352"/>
+          </a:xfrm>
+          <a:prstGeom prst="rect">
+            <a:avLst/>
+          </a:prstGeom>
+          <a:noFill/>
+          <a:extLst>
+            <a:ext uri="{909E8E84-426E-40DD-AFC4-6F175D3DCCD1}">
+              <a14:hiddenFill xmlns:a14="http://schemas.microsoft.com/office/drawing/2010/main">
+                <a:solidFill>
+                  <a:srgbClr val="FFFFFF"/>
+                </a:solidFill>
+              </a14:hiddenFill>
+            </a:ext>
+          </a:extLst>
+        </p:spPr>
+      </p:pic>
+      <p:pic>
+        <p:nvPicPr>
+          <p:cNvPr id="29" name="Picture 28">
+            <a:extLst>
+              <a:ext uri="{FF2B5EF4-FFF2-40B4-BE49-F238E27FC236}">
+                <a16:creationId xmlns:a16="http://schemas.microsoft.com/office/drawing/2014/main" id="{9505837B-1FD6-4DC8-BEED-8132BCCDE6B8}"/>
+              </a:ext>
+            </a:extLst>
+          </p:cNvPr>
+          <p:cNvPicPr>
+            <a:picLocks noChangeAspect="1"/>
+          </p:cNvPicPr>
+          <p:nvPr/>
+        </p:nvPicPr>
+        <p:blipFill>
+          <a:blip r:embed="rId7">
+            <a:extLst>
+              <a:ext uri="{28A0092B-C50C-407E-A947-70E740481C1C}">
+                <a14:useLocalDpi xmlns:a14="http://schemas.microsoft.com/office/drawing/2010/main" val="0"/>
+              </a:ext>
+            </a:extLst>
+          </a:blip>
+          <a:stretch>
+            <a:fillRect/>
+          </a:stretch>
+        </p:blipFill>
+        <p:spPr>
+          <a:xfrm>
+            <a:off x="4829971" y="5381429"/>
+            <a:ext cx="780290" cy="780290"/>
+          </a:xfrm>
+          <a:prstGeom prst="rect">
+            <a:avLst/>
+          </a:prstGeom>
+        </p:spPr>
+      </p:pic>
+      <p:pic>
+        <p:nvPicPr>
+          <p:cNvPr id="30" name="Picture 29" descr="A picture containing electronics, display&#10;&#10;Description generated with very high confidence">
+            <a:extLst>
+              <a:ext uri="{FF2B5EF4-FFF2-40B4-BE49-F238E27FC236}">
+                <a16:creationId xmlns:a16="http://schemas.microsoft.com/office/drawing/2014/main" id="{CC2D5152-F8C8-47D9-971F-8DE6FDD8CD9E}"/>
+              </a:ext>
+            </a:extLst>
+          </p:cNvPr>
+          <p:cNvPicPr>
+            <a:picLocks noChangeAspect="1"/>
+          </p:cNvPicPr>
+          <p:nvPr/>
+        </p:nvPicPr>
+        <p:blipFill>
+          <a:blip r:embed="rId8">
+            <a:extLst>
+              <a:ext uri="{28A0092B-C50C-407E-A947-70E740481C1C}">
+                <a14:useLocalDpi xmlns:a14="http://schemas.microsoft.com/office/drawing/2010/main" val="0"/>
+              </a:ext>
+            </a:extLst>
+          </a:blip>
+          <a:stretch>
+            <a:fillRect/>
+          </a:stretch>
+        </p:blipFill>
+        <p:spPr>
+          <a:xfrm>
+            <a:off x="4807102" y="4485018"/>
+            <a:ext cx="780290" cy="780290"/>
+          </a:xfrm>
+          <a:prstGeom prst="rect">
+            <a:avLst/>
+          </a:prstGeom>
+        </p:spPr>
+      </p:pic>
+      <p:sp>
+        <p:nvSpPr>
+          <p:cNvPr id="32" name="Rectangle 31">
+            <a:extLst>
+              <a:ext uri="{FF2B5EF4-FFF2-40B4-BE49-F238E27FC236}">
+                <a16:creationId xmlns:a16="http://schemas.microsoft.com/office/drawing/2014/main" id="{0448F38F-6307-436E-9149-D83856B50602}"/>
+              </a:ext>
+            </a:extLst>
+          </p:cNvPr>
+          <p:cNvSpPr/>
+          <p:nvPr/>
+        </p:nvSpPr>
+        <p:spPr>
+          <a:xfrm>
+            <a:off x="2241096" y="1302203"/>
+            <a:ext cx="8960304" cy="5229225"/>
+          </a:xfrm>
+          <a:prstGeom prst="rect">
+            <a:avLst/>
+          </a:prstGeom>
+          <a:noFill/>
+        </p:spPr>
+        <p:style>
+          <a:lnRef idx="2">
+            <a:schemeClr val="accent1">
+              <a:shade val="50000"/>
+            </a:schemeClr>
+          </a:lnRef>
+          <a:fillRef idx="1">
+            <a:schemeClr val="accent1"/>
+          </a:fillRef>
+          <a:effectRef idx="0">
+            <a:schemeClr val="accent1"/>
+          </a:effectRef>
+          <a:fontRef idx="minor">
+            <a:schemeClr val="lt1"/>
+          </a:fontRef>
+        </p:style>
+        <p:txBody>
+          <a:bodyPr rtlCol="0" anchor="ctr"/>
+          <a:lstStyle/>
+          <a:p>
+            <a:pPr algn="ctr"/>
+            <a:endParaRPr lang="en-US"/>
+          </a:p>
+        </p:txBody>
+      </p:sp>
+      <p:sp>
+        <p:nvSpPr>
+          <p:cNvPr id="34" name="Rectangle 33">
+            <a:extLst>
+              <a:ext uri="{FF2B5EF4-FFF2-40B4-BE49-F238E27FC236}">
+                <a16:creationId xmlns:a16="http://schemas.microsoft.com/office/drawing/2014/main" id="{FBB51523-8CDF-4033-92C7-CF0E2771BEB5}"/>
+              </a:ext>
+            </a:extLst>
+          </p:cNvPr>
+          <p:cNvSpPr/>
+          <p:nvPr/>
+        </p:nvSpPr>
+        <p:spPr>
+          <a:xfrm>
+            <a:off x="3620861" y="1902461"/>
+            <a:ext cx="3198510" cy="4347300"/>
+          </a:xfrm>
+          <a:prstGeom prst="rect">
+            <a:avLst/>
+          </a:prstGeom>
+          <a:noFill/>
+          <a:ln>
+            <a:solidFill>
+              <a:schemeClr val="bg1">
+                <a:lumMod val="50000"/>
+              </a:schemeClr>
+            </a:solidFill>
+          </a:ln>
+        </p:spPr>
+        <p:style>
+          <a:lnRef idx="2">
+            <a:schemeClr val="accent1">
+              <a:shade val="50000"/>
+            </a:schemeClr>
+          </a:lnRef>
+          <a:fillRef idx="1">
+            <a:schemeClr val="accent1"/>
+          </a:fillRef>
+          <a:effectRef idx="0">
+            <a:schemeClr val="accent1"/>
+          </a:effectRef>
+          <a:fontRef idx="minor">
+            <a:schemeClr val="lt1"/>
+          </a:fontRef>
+        </p:style>
+        <p:txBody>
+          <a:bodyPr rtlCol="0" anchor="ctr"/>
+          <a:lstStyle/>
+          <a:p>
+            <a:pPr algn="ctr"/>
+            <a:endParaRPr lang="en-US"/>
+          </a:p>
+        </p:txBody>
+      </p:sp>
+      <p:pic>
+        <p:nvPicPr>
+          <p:cNvPr id="36" name="Picture 35" descr="A picture containing furniture, table&#10;&#10;Description generated with high confidence">
+            <a:extLst>
+              <a:ext uri="{FF2B5EF4-FFF2-40B4-BE49-F238E27FC236}">
+                <a16:creationId xmlns:a16="http://schemas.microsoft.com/office/drawing/2014/main" id="{2840701B-79E8-4F4D-A9CC-891BAC3D782F}"/>
+              </a:ext>
+            </a:extLst>
+          </p:cNvPr>
+          <p:cNvPicPr>
+            <a:picLocks noChangeAspect="1"/>
+          </p:cNvPicPr>
+          <p:nvPr/>
+        </p:nvPicPr>
+        <p:blipFill>
+          <a:blip r:embed="rId9">
+            <a:extLst>
+              <a:ext uri="{28A0092B-C50C-407E-A947-70E740481C1C}">
+                <a14:useLocalDpi xmlns:a14="http://schemas.microsoft.com/office/drawing/2010/main" val="0"/>
+              </a:ext>
+            </a:extLst>
+          </a:blip>
+          <a:stretch>
+            <a:fillRect/>
+          </a:stretch>
+        </p:blipFill>
+        <p:spPr>
+          <a:xfrm>
+            <a:off x="3230716" y="1512316"/>
+            <a:ext cx="780290" cy="780290"/>
+          </a:xfrm>
+          <a:prstGeom prst="rect">
+            <a:avLst/>
+          </a:prstGeom>
+          <a:solidFill>
+            <a:schemeClr val="bg1"/>
+          </a:solidFill>
+        </p:spPr>
+      </p:pic>
+      <p:sp>
+        <p:nvSpPr>
+          <p:cNvPr id="38" name="Rectangle 37">
+            <a:extLst>
+              <a:ext uri="{FF2B5EF4-FFF2-40B4-BE49-F238E27FC236}">
+                <a16:creationId xmlns:a16="http://schemas.microsoft.com/office/drawing/2014/main" id="{55566AF0-5FE0-4EBC-9060-202D4531968F}"/>
+              </a:ext>
+            </a:extLst>
+          </p:cNvPr>
+          <p:cNvSpPr/>
+          <p:nvPr/>
+        </p:nvSpPr>
+        <p:spPr>
+          <a:xfrm>
+            <a:off x="4298495" y="3564783"/>
+            <a:ext cx="1797505" cy="1901151"/>
+          </a:xfrm>
+          <a:prstGeom prst="rect">
+            <a:avLst/>
+          </a:prstGeom>
+          <a:noFill/>
+          <a:ln w="38100">
+            <a:solidFill>
+              <a:schemeClr val="bg1">
+                <a:lumMod val="75000"/>
+              </a:schemeClr>
+            </a:solidFill>
+            <a:prstDash val="dash"/>
+          </a:ln>
+          <a:effectLst>
+            <a:glow rad="63500">
+              <a:schemeClr val="accent4">
+                <a:satMod val="175000"/>
+                <a:alpha val="40000"/>
+              </a:schemeClr>
+            </a:glow>
+          </a:effectLst>
+        </p:spPr>
+        <p:style>
+          <a:lnRef idx="2">
+            <a:schemeClr val="accent1">
+              <a:shade val="50000"/>
+            </a:schemeClr>
+          </a:lnRef>
+          <a:fillRef idx="1">
+            <a:schemeClr val="accent1"/>
+          </a:fillRef>
+          <a:effectRef idx="0">
+            <a:schemeClr val="accent1"/>
+          </a:effectRef>
+          <a:fontRef idx="minor">
+            <a:schemeClr val="lt1"/>
+          </a:fontRef>
+        </p:style>
+        <p:txBody>
+          <a:bodyPr rtlCol="0" anchor="ctr"/>
+          <a:lstStyle/>
+          <a:p>
+            <a:pPr algn="ctr"/>
+            <a:endParaRPr lang="en-US"/>
+          </a:p>
+        </p:txBody>
+      </p:sp>
+      <p:sp>
+        <p:nvSpPr>
+          <p:cNvPr id="40" name="TextBox 39">
+            <a:extLst>
+              <a:ext uri="{FF2B5EF4-FFF2-40B4-BE49-F238E27FC236}">
+                <a16:creationId xmlns:a16="http://schemas.microsoft.com/office/drawing/2014/main" id="{0FCF6837-D329-4B6A-8414-F08DC42355C5}"/>
+              </a:ext>
+            </a:extLst>
+          </p:cNvPr>
+          <p:cNvSpPr txBox="1"/>
+          <p:nvPr/>
+        </p:nvSpPr>
+        <p:spPr>
+          <a:xfrm>
+            <a:off x="2466109" y="3034138"/>
+            <a:ext cx="846129" cy="276999"/>
+          </a:xfrm>
+          <a:prstGeom prst="rect">
+            <a:avLst/>
+          </a:prstGeom>
+          <a:noFill/>
+        </p:spPr>
+        <p:txBody>
+          <a:bodyPr wrap="none" rtlCol="0">
+            <a:spAutoFit/>
+          </a:bodyPr>
+          <a:lstStyle/>
+          <a:p>
+            <a:pPr algn="ctr"/>
+            <a:r>
+              <a:rPr lang="en-US" sz="1200" dirty="0"/>
+              <a:t>Azure AD</a:t>
+            </a:r>
+          </a:p>
+        </p:txBody>
+      </p:sp>
+      <p:sp>
+        <p:nvSpPr>
+          <p:cNvPr id="41" name="TextBox 40">
+            <a:extLst>
+              <a:ext uri="{FF2B5EF4-FFF2-40B4-BE49-F238E27FC236}">
+                <a16:creationId xmlns:a16="http://schemas.microsoft.com/office/drawing/2014/main" id="{55B126C6-70F5-4088-BDB5-965D9E2190AA}"/>
+              </a:ext>
+            </a:extLst>
+          </p:cNvPr>
+          <p:cNvSpPr txBox="1"/>
+          <p:nvPr/>
+        </p:nvSpPr>
+        <p:spPr>
+          <a:xfrm>
+            <a:off x="4065909" y="1579826"/>
+            <a:ext cx="1485728" cy="276999"/>
+          </a:xfrm>
+          <a:prstGeom prst="rect">
+            <a:avLst/>
+          </a:prstGeom>
+          <a:noFill/>
+        </p:spPr>
+        <p:txBody>
+          <a:bodyPr wrap="none" rtlCol="0">
+            <a:spAutoFit/>
+          </a:bodyPr>
+          <a:lstStyle/>
+          <a:p>
+            <a:r>
+              <a:rPr lang="en-US" sz="1200" dirty="0" err="1"/>
+              <a:t>datascience</a:t>
+            </a:r>
+            <a:r>
+              <a:rPr lang="en-US" sz="1200" dirty="0"/>
+              <a:t>-hol-</a:t>
+            </a:r>
+            <a:r>
+              <a:rPr lang="en-US" sz="1200" dirty="0" err="1"/>
+              <a:t>rg</a:t>
+            </a:r>
+            <a:endParaRPr lang="en-US" sz="1200" dirty="0"/>
+          </a:p>
+        </p:txBody>
+      </p:sp>
+      <p:sp>
+        <p:nvSpPr>
+          <p:cNvPr id="43" name="TextBox 42">
+            <a:extLst>
+              <a:ext uri="{FF2B5EF4-FFF2-40B4-BE49-F238E27FC236}">
+                <a16:creationId xmlns:a16="http://schemas.microsoft.com/office/drawing/2014/main" id="{FF45A7C9-1F7E-471C-8FB4-A6A024F1AE00}"/>
+              </a:ext>
+            </a:extLst>
+          </p:cNvPr>
+          <p:cNvSpPr txBox="1"/>
+          <p:nvPr/>
+        </p:nvSpPr>
+        <p:spPr>
+          <a:xfrm>
+            <a:off x="3717624" y="3177010"/>
+            <a:ext cx="1410964" cy="253916"/>
+          </a:xfrm>
+          <a:prstGeom prst="rect">
+            <a:avLst/>
+          </a:prstGeom>
+          <a:noFill/>
+        </p:spPr>
+        <p:txBody>
+          <a:bodyPr wrap="none" rtlCol="0">
+            <a:spAutoFit/>
+          </a:bodyPr>
+          <a:lstStyle/>
+          <a:p>
+            <a:pPr algn="ctr"/>
+            <a:r>
+              <a:rPr lang="en-US" sz="1050" dirty="0"/>
+              <a:t>ML Experimentation</a:t>
+            </a:r>
+          </a:p>
+        </p:txBody>
+      </p:sp>
+      <p:sp>
+        <p:nvSpPr>
+          <p:cNvPr id="44" name="TextBox 43">
+            <a:extLst>
+              <a:ext uri="{FF2B5EF4-FFF2-40B4-BE49-F238E27FC236}">
+                <a16:creationId xmlns:a16="http://schemas.microsoft.com/office/drawing/2014/main" id="{E3FB9C2A-9D8D-4D5E-8BB1-6E76D1BE042D}"/>
+              </a:ext>
+            </a:extLst>
+          </p:cNvPr>
+          <p:cNvSpPr txBox="1"/>
+          <p:nvPr/>
+        </p:nvSpPr>
+        <p:spPr>
+          <a:xfrm>
+            <a:off x="4509398" y="5180764"/>
+            <a:ext cx="1375698" cy="276999"/>
+          </a:xfrm>
+          <a:prstGeom prst="rect">
+            <a:avLst/>
+          </a:prstGeom>
+          <a:noFill/>
+        </p:spPr>
+        <p:txBody>
+          <a:bodyPr wrap="none" rtlCol="0">
+            <a:spAutoFit/>
+          </a:bodyPr>
+          <a:lstStyle/>
+          <a:p>
+            <a:pPr algn="ctr"/>
+            <a:r>
+              <a:rPr lang="en-US" sz="1200" dirty="0"/>
+              <a:t>Data Science VM</a:t>
+            </a:r>
+          </a:p>
+        </p:txBody>
+      </p:sp>
+      <p:sp>
+        <p:nvSpPr>
+          <p:cNvPr id="45" name="TextBox 44">
+            <a:extLst>
+              <a:ext uri="{FF2B5EF4-FFF2-40B4-BE49-F238E27FC236}">
+                <a16:creationId xmlns:a16="http://schemas.microsoft.com/office/drawing/2014/main" id="{5A057C04-D841-419C-A8DF-5D2268AD4661}"/>
+              </a:ext>
+            </a:extLst>
+          </p:cNvPr>
+          <p:cNvSpPr txBox="1"/>
+          <p:nvPr/>
+        </p:nvSpPr>
+        <p:spPr>
+          <a:xfrm>
+            <a:off x="4441892" y="4186789"/>
+            <a:ext cx="654218" cy="276999"/>
+          </a:xfrm>
+          <a:prstGeom prst="rect">
+            <a:avLst/>
+          </a:prstGeom>
+          <a:noFill/>
+        </p:spPr>
+        <p:txBody>
+          <a:bodyPr wrap="none" rtlCol="0">
+            <a:spAutoFit/>
+          </a:bodyPr>
+          <a:lstStyle/>
+          <a:p>
+            <a:pPr algn="ctr"/>
+            <a:r>
+              <a:rPr lang="en-US" sz="1200" dirty="0"/>
+              <a:t>docker</a:t>
+            </a:r>
+          </a:p>
+        </p:txBody>
+      </p:sp>
+      <p:sp>
+        <p:nvSpPr>
+          <p:cNvPr id="46" name="TextBox 45">
+            <a:extLst>
+              <a:ext uri="{FF2B5EF4-FFF2-40B4-BE49-F238E27FC236}">
+                <a16:creationId xmlns:a16="http://schemas.microsoft.com/office/drawing/2014/main" id="{2263EAD3-5869-4A7C-BE4B-4D1F14EC4EA4}"/>
+              </a:ext>
+            </a:extLst>
+          </p:cNvPr>
+          <p:cNvSpPr txBox="1"/>
+          <p:nvPr/>
+        </p:nvSpPr>
+        <p:spPr>
+          <a:xfrm>
+            <a:off x="5127190" y="4186789"/>
+            <a:ext cx="980589" cy="276999"/>
+          </a:xfrm>
+          <a:prstGeom prst="rect">
+            <a:avLst/>
+          </a:prstGeom>
+          <a:noFill/>
+        </p:spPr>
+        <p:txBody>
+          <a:bodyPr wrap="none" rtlCol="0">
+            <a:spAutoFit/>
+          </a:bodyPr>
+          <a:lstStyle/>
+          <a:p>
+            <a:pPr algn="ctr"/>
+            <a:r>
+              <a:rPr lang="en-US" sz="1200" dirty="0"/>
+              <a:t>Workbench</a:t>
+            </a:r>
+          </a:p>
+        </p:txBody>
+      </p:sp>
+      <p:sp>
+        <p:nvSpPr>
+          <p:cNvPr id="47" name="TextBox 46">
+            <a:extLst>
+              <a:ext uri="{FF2B5EF4-FFF2-40B4-BE49-F238E27FC236}">
+                <a16:creationId xmlns:a16="http://schemas.microsoft.com/office/drawing/2014/main" id="{CF1BF90B-78D0-4D69-A9B5-2E512D58F302}"/>
+              </a:ext>
+            </a:extLst>
+          </p:cNvPr>
+          <p:cNvSpPr txBox="1"/>
+          <p:nvPr/>
+        </p:nvSpPr>
+        <p:spPr>
+          <a:xfrm>
+            <a:off x="5197550" y="3177010"/>
+            <a:ext cx="1492716" cy="261610"/>
+          </a:xfrm>
+          <a:prstGeom prst="rect">
+            <a:avLst/>
+          </a:prstGeom>
+          <a:noFill/>
+        </p:spPr>
+        <p:txBody>
+          <a:bodyPr wrap="none" rtlCol="0">
+            <a:spAutoFit/>
+          </a:bodyPr>
+          <a:lstStyle/>
+          <a:p>
+            <a:pPr algn="ctr"/>
+            <a:r>
+              <a:rPr lang="en-US" sz="1050" dirty="0"/>
+              <a:t>Model Management</a:t>
+            </a:r>
+          </a:p>
+        </p:txBody>
+      </p:sp>
+      <p:sp>
+        <p:nvSpPr>
+          <p:cNvPr id="48" name="TextBox 47">
+            <a:extLst>
+              <a:ext uri="{FF2B5EF4-FFF2-40B4-BE49-F238E27FC236}">
+                <a16:creationId xmlns:a16="http://schemas.microsoft.com/office/drawing/2014/main" id="{F92F720D-9835-497B-865A-E84821E9FDEF}"/>
+              </a:ext>
+            </a:extLst>
+          </p:cNvPr>
+          <p:cNvSpPr txBox="1"/>
+          <p:nvPr/>
+        </p:nvSpPr>
+        <p:spPr>
+          <a:xfrm>
+            <a:off x="4576574" y="5961397"/>
+            <a:ext cx="1287084" cy="276999"/>
+          </a:xfrm>
+          <a:prstGeom prst="rect">
+            <a:avLst/>
+          </a:prstGeom>
+          <a:noFill/>
+        </p:spPr>
+        <p:txBody>
+          <a:bodyPr wrap="none" rtlCol="0">
+            <a:spAutoFit/>
+          </a:bodyPr>
+          <a:lstStyle/>
+          <a:p>
+            <a:pPr algn="ctr"/>
+            <a:r>
+              <a:rPr lang="en-US" sz="1200" dirty="0"/>
+              <a:t>Virtual Network</a:t>
+            </a:r>
+          </a:p>
+        </p:txBody>
+      </p:sp>
+      <p:sp>
+        <p:nvSpPr>
+          <p:cNvPr id="37" name="Rectangle 36">
+            <a:extLst>
+              <a:ext uri="{FF2B5EF4-FFF2-40B4-BE49-F238E27FC236}">
+                <a16:creationId xmlns:a16="http://schemas.microsoft.com/office/drawing/2014/main" id="{F6DE6E2F-F7BF-4B7F-B1DB-BF9382AF29DC}"/>
+              </a:ext>
+            </a:extLst>
+          </p:cNvPr>
+          <p:cNvSpPr/>
+          <p:nvPr/>
+        </p:nvSpPr>
+        <p:spPr>
+          <a:xfrm>
+            <a:off x="349819" y="1302203"/>
+            <a:ext cx="1797674" cy="2061915"/>
+          </a:xfrm>
+          <a:prstGeom prst="rect">
+            <a:avLst/>
+          </a:prstGeom>
+          <a:noFill/>
+          <a:ln>
+            <a:solidFill>
+              <a:schemeClr val="accent2"/>
+            </a:solidFill>
+            <a:prstDash val="dashDot"/>
+          </a:ln>
+        </p:spPr>
+        <p:style>
+          <a:lnRef idx="2">
+            <a:schemeClr val="accent1">
+              <a:shade val="50000"/>
+            </a:schemeClr>
+          </a:lnRef>
+          <a:fillRef idx="1">
+            <a:schemeClr val="accent1"/>
+          </a:fillRef>
+          <a:effectRef idx="0">
+            <a:schemeClr val="accent1"/>
+          </a:effectRef>
+          <a:fontRef idx="minor">
+            <a:schemeClr val="lt1"/>
+          </a:fontRef>
+        </p:style>
+        <p:txBody>
+          <a:bodyPr rtlCol="0" anchor="ctr"/>
+          <a:lstStyle/>
+          <a:p>
+            <a:pPr algn="ctr"/>
+            <a:endParaRPr lang="en-US"/>
+          </a:p>
+        </p:txBody>
+      </p:sp>
+      <p:grpSp>
+        <p:nvGrpSpPr>
+          <p:cNvPr id="3" name="Group 2">
+            <a:extLst>
+              <a:ext uri="{FF2B5EF4-FFF2-40B4-BE49-F238E27FC236}">
+                <a16:creationId xmlns:a16="http://schemas.microsoft.com/office/drawing/2014/main" id="{C13856E4-5F8A-4075-80A6-9AF876CAB532}"/>
+              </a:ext>
+            </a:extLst>
+          </p:cNvPr>
+          <p:cNvGrpSpPr/>
+          <p:nvPr/>
+        </p:nvGrpSpPr>
+        <p:grpSpPr>
+          <a:xfrm>
+            <a:off x="858165" y="1796089"/>
+            <a:ext cx="780983" cy="1074142"/>
+            <a:chOff x="858165" y="1689233"/>
+            <a:chExt cx="780983" cy="1074142"/>
+          </a:xfrm>
+        </p:grpSpPr>
+        <p:pic>
+          <p:nvPicPr>
+            <p:cNvPr id="35" name="Picture 34" descr="A picture containing electronics, display&#10;&#10;Description generated with very high confidence">
+              <a:extLst>
+                <a:ext uri="{FF2B5EF4-FFF2-40B4-BE49-F238E27FC236}">
+                  <a16:creationId xmlns:a16="http://schemas.microsoft.com/office/drawing/2014/main" id="{1ACC2136-EF38-483C-A758-00C48AC1AA38}"/>
+                </a:ext>
+              </a:extLst>
+            </p:cNvPr>
+            <p:cNvPicPr>
+              <a:picLocks noChangeAspect="1"/>
+            </p:cNvPicPr>
+            <p:nvPr/>
+          </p:nvPicPr>
+          <p:blipFill>
+            <a:blip r:embed="rId8">
+              <a:extLst>
+                <a:ext uri="{28A0092B-C50C-407E-A947-70E740481C1C}">
+                  <a14:useLocalDpi xmlns:a14="http://schemas.microsoft.com/office/drawing/2010/main" val="0"/>
+                </a:ext>
+              </a:extLst>
+            </a:blip>
+            <a:stretch>
+              <a:fillRect/>
+            </a:stretch>
+          </p:blipFill>
+          <p:spPr>
+            <a:xfrm>
+              <a:off x="858511" y="1689233"/>
+              <a:ext cx="780290" cy="780290"/>
+            </a:xfrm>
+            <a:prstGeom prst="rect">
+              <a:avLst/>
+            </a:prstGeom>
+            <a:noFill/>
+            <a:effectLst>
+              <a:glow rad="228600">
+                <a:schemeClr val="accent2">
+                  <a:satMod val="175000"/>
+                  <a:alpha val="40000"/>
+                </a:schemeClr>
+              </a:glow>
+            </a:effectLst>
+          </p:spPr>
+        </p:pic>
+        <p:sp>
+          <p:nvSpPr>
+            <p:cNvPr id="42" name="TextBox 41">
+              <a:extLst>
+                <a:ext uri="{FF2B5EF4-FFF2-40B4-BE49-F238E27FC236}">
+                  <a16:creationId xmlns:a16="http://schemas.microsoft.com/office/drawing/2014/main" id="{CED9E762-FD4E-4ABC-9BB2-8FE287CAB6EF}"/>
+                </a:ext>
+              </a:extLst>
+            </p:cNvPr>
+            <p:cNvSpPr txBox="1"/>
+            <p:nvPr/>
+          </p:nvSpPr>
+          <p:spPr>
+            <a:xfrm>
+              <a:off x="858165" y="2486376"/>
+              <a:ext cx="780983" cy="276999"/>
+            </a:xfrm>
+            <a:prstGeom prst="rect">
+              <a:avLst/>
+            </a:prstGeom>
+            <a:noFill/>
+          </p:spPr>
+          <p:txBody>
+            <a:bodyPr wrap="none" rtlCol="0">
+              <a:spAutoFit/>
+            </a:bodyPr>
+            <a:lstStyle/>
+            <a:p>
+              <a:pPr algn="ctr"/>
+              <a:r>
+                <a:rPr lang="en-US" sz="1200" dirty="0"/>
+                <a:t>GPU VM</a:t>
+              </a:r>
+            </a:p>
+          </p:txBody>
+        </p:sp>
+      </p:grpSp>
+      <p:cxnSp>
+        <p:nvCxnSpPr>
+          <p:cNvPr id="5" name="Connector: Elbow 4">
+            <a:extLst>
+              <a:ext uri="{FF2B5EF4-FFF2-40B4-BE49-F238E27FC236}">
+                <a16:creationId xmlns:a16="http://schemas.microsoft.com/office/drawing/2014/main" id="{B5B4AE7C-B3A3-47AC-B0A0-D484AC9EB38C}"/>
+              </a:ext>
+            </a:extLst>
+          </p:cNvPr>
+          <p:cNvCxnSpPr>
+            <a:stCxn id="38" idx="1"/>
+            <a:endCxn id="42" idx="2"/>
+          </p:cNvCxnSpPr>
+          <p:nvPr/>
+        </p:nvCxnSpPr>
+        <p:spPr>
+          <a:xfrm rot="10800000">
+            <a:off x="1248657" y="2870231"/>
+            <a:ext cx="3049838" cy="1645128"/>
+          </a:xfrm>
+          <a:prstGeom prst="bentConnector2">
+            <a:avLst/>
+          </a:prstGeom>
+          <a:ln>
+            <a:tailEnd type="triangle"/>
+          </a:ln>
+        </p:spPr>
+        <p:style>
+          <a:lnRef idx="3">
+            <a:schemeClr val="accent2"/>
+          </a:lnRef>
+          <a:fillRef idx="0">
+            <a:schemeClr val="accent2"/>
+          </a:fillRef>
+          <a:effectRef idx="2">
+            <a:schemeClr val="accent2"/>
+          </a:effectRef>
+          <a:fontRef idx="minor">
+            <a:schemeClr val="tx1"/>
+          </a:fontRef>
+        </p:style>
+      </p:cxnSp>
+      <p:sp>
+        <p:nvSpPr>
+          <p:cNvPr id="50" name="TextBox 49">
+            <a:extLst>
+              <a:ext uri="{FF2B5EF4-FFF2-40B4-BE49-F238E27FC236}">
+                <a16:creationId xmlns:a16="http://schemas.microsoft.com/office/drawing/2014/main" id="{29782F94-656D-45DC-91DA-7415F73D0D11}"/>
+              </a:ext>
+            </a:extLst>
+          </p:cNvPr>
+          <p:cNvSpPr txBox="1"/>
+          <p:nvPr/>
+        </p:nvSpPr>
+        <p:spPr>
+          <a:xfrm>
+            <a:off x="1322732" y="4161260"/>
+            <a:ext cx="1353256" cy="276999"/>
+          </a:xfrm>
+          <a:prstGeom prst="rect">
+            <a:avLst/>
+          </a:prstGeom>
+          <a:noFill/>
+        </p:spPr>
+        <p:txBody>
+          <a:bodyPr wrap="none" rtlCol="0">
+            <a:spAutoFit/>
+          </a:bodyPr>
+          <a:lstStyle/>
+          <a:p>
+            <a:pPr algn="ctr"/>
+            <a:r>
+              <a:rPr lang="en-US" sz="1200" i="1" dirty="0"/>
+              <a:t>Push Experiment</a:t>
+            </a:r>
+          </a:p>
+        </p:txBody>
+      </p:sp>
+    </p:spTree>
+    <p:extLst>
+      <p:ext uri="{BB962C8B-B14F-4D97-AF65-F5344CB8AC3E}">
+        <p14:creationId xmlns:p14="http://schemas.microsoft.com/office/powerpoint/2010/main" val="1848362082"/>
+      </p:ext>
+    </p:extLst>
+  </p:cSld>
+  <p:clrMapOvr>
+    <a:masterClrMapping/>
+  </p:clrMapOvr>
+</p:sld>
+</file>
+
+<file path=ppt/slides/slide12.xml><?xml version="1.0" encoding="utf-8"?>
 <p:sld xmlns:a="http://schemas.openxmlformats.org/drawingml/2006/main" xmlns:r="http://schemas.openxmlformats.org/officeDocument/2006/relationships" xmlns:p="http://schemas.openxmlformats.org/presentationml/2006/main">
   <p:cSld>
     <p:spTree>
@@ -4657,7 +6835,7 @@
 </p:sld>
 </file>
 
-<file path=ppt/slides/slide11.xml><?xml version="1.0" encoding="utf-8"?>
+<file path=ppt/slides/slide13.xml><?xml version="1.0" encoding="utf-8"?>
 <p:sld xmlns:a="http://schemas.openxmlformats.org/drawingml/2006/main" xmlns:r="http://schemas.openxmlformats.org/officeDocument/2006/relationships" xmlns:p="http://schemas.openxmlformats.org/presentationml/2006/main">
   <p:cSld>
     <p:spTree>
@@ -4687,7 +6865,7 @@
 </p:sld>
 </file>
 
-<file path=ppt/slides/slide12.xml><?xml version="1.0" encoding="utf-8"?>
+<file path=ppt/slides/slide14.xml><?xml version="1.0" encoding="utf-8"?>
 <p:sld xmlns:a="http://schemas.openxmlformats.org/drawingml/2006/main" xmlns:r="http://schemas.openxmlformats.org/officeDocument/2006/relationships" xmlns:p="http://schemas.openxmlformats.org/presentationml/2006/main">
   <p:cSld>
     <p:spTree>
@@ -10171,6 +12349,14 @@
             </a:solidFill>
             <a:prstDash val="dash"/>
           </a:ln>
+          <a:effectLst>
+            <a:glow rad="63500">
+              <a:schemeClr val="accent4">
+                <a:satMod val="175000"/>
+                <a:alpha val="40000"/>
+              </a:schemeClr>
+            </a:glow>
+          </a:effectLst>
         </p:spPr>
         <p:style>
           <a:lnRef idx="2">
@@ -11147,6 +13333,14 @@
             </a:solidFill>
             <a:prstDash val="dash"/>
           </a:ln>
+          <a:effectLst>
+            <a:glow rad="63500">
+              <a:schemeClr val="accent4">
+                <a:satMod val="175000"/>
+                <a:alpha val="40000"/>
+              </a:schemeClr>
+            </a:glow>
+          </a:effectLst>
         </p:spPr>
         <p:style>
           <a:lnRef idx="2">
@@ -12128,6 +14322,14 @@
             </a:solidFill>
             <a:prstDash val="dash"/>
           </a:ln>
+          <a:effectLst>
+            <a:glow rad="63500">
+              <a:schemeClr val="accent4">
+                <a:satMod val="175000"/>
+                <a:alpha val="40000"/>
+              </a:schemeClr>
+            </a:glow>
+          </a:effectLst>
         </p:spPr>
         <p:style>
           <a:lnRef idx="2">

</xml_diff>